<commit_message>
feat: update shape in presentation
</commit_message>
<xml_diff>
--- a/assets/PresentationTemplate.pptx
+++ b/assets/PresentationTemplate.pptx
@@ -105,328 +105,7 @@
       </a:defRPr>
     </a:lvl9pPr>
   </p:defaultTextStyle>
-  <p:extLst>
-    <p:ext uri="{EFAFB233-063F-42B5-8137-9DF3F51BA10A}">
-      <p15:sldGuideLst xmlns:p15="http://schemas.microsoft.com/office/powerpoint/2012/main"/>
-    </p:ext>
-  </p:extLst>
 </p:presentation>
-</file>
-
-<file path=ppt/revisionInfo.xml><?xml version="1.0" encoding="utf-8"?>
-<p1510:revInfo xmlns:a="http://schemas.openxmlformats.org/drawingml/2006/main" xmlns:r="http://schemas.openxmlformats.org/officeDocument/2006/relationships" xmlns:p1510="http://schemas.microsoft.com/office/powerpoint/2015/10/main">
-  <p1510:revLst>
-    <p1510:client id="{F613443F-DC8E-4D40-B362-51FAAD0F681F}" v="3" dt="2025-01-30T17:50:21.358"/>
-  </p1510:revLst>
-</p1510:revInfo>
-</file>
-
-<file path=ppt/changesInfos/changesInfo1.xml><?xml version="1.0" encoding="utf-8"?>
-<pc:chgInfo xmlns:a="http://schemas.openxmlformats.org/drawingml/2006/main" xmlns:r="http://schemas.openxmlformats.org/officeDocument/2006/relationships" xmlns:ac="http://schemas.microsoft.com/office/drawing/2013/main/command" xmlns:pc="http://schemas.microsoft.com/office/powerpoint/2013/main/command">
-  <pc:docChgLst>
-    <pc:chgData name="Florent RAVENEL" userId="2f2e9a1aff29c702" providerId="LiveId" clId="{F613443F-DC8E-4D40-B362-51FAAD0F681F}"/>
-    <pc:docChg chg="undo custSel modSld">
-      <pc:chgData name="Florent RAVENEL" userId="2f2e9a1aff29c702" providerId="LiveId" clId="{F613443F-DC8E-4D40-B362-51FAAD0F681F}" dt="2025-01-30T17:51:07.605" v="20" actId="26606"/>
-      <pc:docMkLst>
-        <pc:docMk/>
-      </pc:docMkLst>
-      <pc:sldChg chg="addSp delSp modSp mod setBg">
-        <pc:chgData name="Florent RAVENEL" userId="2f2e9a1aff29c702" providerId="LiveId" clId="{F613443F-DC8E-4D40-B362-51FAAD0F681F}" dt="2025-01-30T17:50:57.759" v="19" actId="26606"/>
-        <pc:sldMkLst>
-          <pc:docMk/>
-          <pc:sldMk cId="1256506707" sldId="256"/>
-        </pc:sldMkLst>
-        <pc:spChg chg="mod">
-          <ac:chgData name="Florent RAVENEL" userId="2f2e9a1aff29c702" providerId="LiveId" clId="{F613443F-DC8E-4D40-B362-51FAAD0F681F}" dt="2025-01-30T17:50:57.759" v="19" actId="26606"/>
-          <ac:spMkLst>
-            <pc:docMk/>
-            <pc:sldMk cId="1256506707" sldId="256"/>
-            <ac:spMk id="2" creationId="{53AFA96C-BF42-B18A-E6EA-2CC58746410C}"/>
-          </ac:spMkLst>
-        </pc:spChg>
-        <pc:spChg chg="mod">
-          <ac:chgData name="Florent RAVENEL" userId="2f2e9a1aff29c702" providerId="LiveId" clId="{F613443F-DC8E-4D40-B362-51FAAD0F681F}" dt="2025-01-30T17:50:57.759" v="19" actId="26606"/>
-          <ac:spMkLst>
-            <pc:docMk/>
-            <pc:sldMk cId="1256506707" sldId="256"/>
-            <ac:spMk id="3" creationId="{7F96D901-7072-E096-9E66-44CB9B4C9513}"/>
-          </ac:spMkLst>
-        </pc:spChg>
-        <pc:spChg chg="add del">
-          <ac:chgData name="Florent RAVENEL" userId="2f2e9a1aff29c702" providerId="LiveId" clId="{F613443F-DC8E-4D40-B362-51FAAD0F681F}" dt="2025-01-30T17:46:08.447" v="2" actId="26606"/>
-          <ac:spMkLst>
-            <pc:docMk/>
-            <pc:sldMk cId="1256506707" sldId="256"/>
-            <ac:spMk id="10" creationId="{A3363022-C969-41E9-8EB2-E4C94908C1FA}"/>
-          </ac:spMkLst>
-        </pc:spChg>
-        <pc:spChg chg="add del">
-          <ac:chgData name="Florent RAVENEL" userId="2f2e9a1aff29c702" providerId="LiveId" clId="{F613443F-DC8E-4D40-B362-51FAAD0F681F}" dt="2025-01-30T17:46:08.447" v="2" actId="26606"/>
-          <ac:spMkLst>
-            <pc:docMk/>
-            <pc:sldMk cId="1256506707" sldId="256"/>
-            <ac:spMk id="12" creationId="{8D1AD6B3-BE88-4CEB-BA17-790657CC4729}"/>
-          </ac:spMkLst>
-        </pc:spChg>
-        <pc:spChg chg="add del">
-          <ac:chgData name="Florent RAVENEL" userId="2f2e9a1aff29c702" providerId="LiveId" clId="{F613443F-DC8E-4D40-B362-51FAAD0F681F}" dt="2025-01-30T17:46:20.044" v="6" actId="26606"/>
-          <ac:spMkLst>
-            <pc:docMk/>
-            <pc:sldMk cId="1256506707" sldId="256"/>
-            <ac:spMk id="19" creationId="{0671A8AE-40A1-4631-A6B8-581AFF065482}"/>
-          </ac:spMkLst>
-        </pc:spChg>
-        <pc:spChg chg="add del">
-          <ac:chgData name="Florent RAVENEL" userId="2f2e9a1aff29c702" providerId="LiveId" clId="{F613443F-DC8E-4D40-B362-51FAAD0F681F}" dt="2025-01-30T17:46:20.044" v="6" actId="26606"/>
-          <ac:spMkLst>
-            <pc:docMk/>
-            <pc:sldMk cId="1256506707" sldId="256"/>
-            <ac:spMk id="20" creationId="{AB58EF07-17C2-48CF-ABB0-EEF1F17CB8F0}"/>
-          </ac:spMkLst>
-        </pc:spChg>
-        <pc:spChg chg="add del">
-          <ac:chgData name="Florent RAVENEL" userId="2f2e9a1aff29c702" providerId="LiveId" clId="{F613443F-DC8E-4D40-B362-51FAAD0F681F}" dt="2025-01-30T17:46:20.044" v="6" actId="26606"/>
-          <ac:spMkLst>
-            <pc:docMk/>
-            <pc:sldMk cId="1256506707" sldId="256"/>
-            <ac:spMk id="21" creationId="{AF2F604E-43BE-4DC3-B983-E071523364F8}"/>
-          </ac:spMkLst>
-        </pc:spChg>
-        <pc:spChg chg="add del">
-          <ac:chgData name="Florent RAVENEL" userId="2f2e9a1aff29c702" providerId="LiveId" clId="{F613443F-DC8E-4D40-B362-51FAAD0F681F}" dt="2025-01-30T17:46:20.044" v="6" actId="26606"/>
-          <ac:spMkLst>
-            <pc:docMk/>
-            <pc:sldMk cId="1256506707" sldId="256"/>
-            <ac:spMk id="22" creationId="{08C9B587-E65E-4B52-B37C-ABEBB6E87928}"/>
-          </ac:spMkLst>
-        </pc:spChg>
-        <pc:spChg chg="add del">
-          <ac:chgData name="Florent RAVENEL" userId="2f2e9a1aff29c702" providerId="LiveId" clId="{F613443F-DC8E-4D40-B362-51FAAD0F681F}" dt="2025-01-30T17:46:20.044" v="5" actId="26606"/>
-          <ac:spMkLst>
-            <pc:docMk/>
-            <pc:sldMk cId="1256506707" sldId="256"/>
-            <ac:spMk id="27" creationId="{9203DE33-2CD4-4CA8-9AF3-37C3B65133B0}"/>
-          </ac:spMkLst>
-        </pc:spChg>
-        <pc:spChg chg="add del">
-          <ac:chgData name="Florent RAVENEL" userId="2f2e9a1aff29c702" providerId="LiveId" clId="{F613443F-DC8E-4D40-B362-51FAAD0F681F}" dt="2025-01-30T17:46:20.044" v="5" actId="26606"/>
-          <ac:spMkLst>
-            <pc:docMk/>
-            <pc:sldMk cId="1256506707" sldId="256"/>
-            <ac:spMk id="29" creationId="{0AF57B88-1D4C-41FA-A761-EC1DD10C35CB}"/>
-          </ac:spMkLst>
-        </pc:spChg>
-        <pc:spChg chg="add del">
-          <ac:chgData name="Florent RAVENEL" userId="2f2e9a1aff29c702" providerId="LiveId" clId="{F613443F-DC8E-4D40-B362-51FAAD0F681F}" dt="2025-01-30T17:46:20.044" v="5" actId="26606"/>
-          <ac:spMkLst>
-            <pc:docMk/>
-            <pc:sldMk cId="1256506707" sldId="256"/>
-            <ac:spMk id="31" creationId="{D2548F45-5164-4ABB-8212-7F293FDED8D4}"/>
-          </ac:spMkLst>
-        </pc:spChg>
-        <pc:spChg chg="add del">
-          <ac:chgData name="Florent RAVENEL" userId="2f2e9a1aff29c702" providerId="LiveId" clId="{F613443F-DC8E-4D40-B362-51FAAD0F681F}" dt="2025-01-30T17:46:20.044" v="5" actId="26606"/>
-          <ac:spMkLst>
-            <pc:docMk/>
-            <pc:sldMk cId="1256506707" sldId="256"/>
-            <ac:spMk id="33" creationId="{5E81CCFB-7BEF-4186-86FB-D09450B4D02D}"/>
-          </ac:spMkLst>
-        </pc:spChg>
-        <pc:spChg chg="add del">
-          <ac:chgData name="Florent RAVENEL" userId="2f2e9a1aff29c702" providerId="LiveId" clId="{F613443F-DC8E-4D40-B362-51FAAD0F681F}" dt="2025-01-30T17:50:57.759" v="19" actId="26606"/>
-          <ac:spMkLst>
-            <pc:docMk/>
-            <pc:sldMk cId="1256506707" sldId="256"/>
-            <ac:spMk id="35" creationId="{0671A8AE-40A1-4631-A6B8-581AFF065482}"/>
-          </ac:spMkLst>
-        </pc:spChg>
-        <pc:spChg chg="add del">
-          <ac:chgData name="Florent RAVENEL" userId="2f2e9a1aff29c702" providerId="LiveId" clId="{F613443F-DC8E-4D40-B362-51FAAD0F681F}" dt="2025-01-30T17:50:57.759" v="19" actId="26606"/>
-          <ac:spMkLst>
-            <pc:docMk/>
-            <pc:sldMk cId="1256506707" sldId="256"/>
-            <ac:spMk id="36" creationId="{AB58EF07-17C2-48CF-ABB0-EEF1F17CB8F0}"/>
-          </ac:spMkLst>
-        </pc:spChg>
-        <pc:spChg chg="add del">
-          <ac:chgData name="Florent RAVENEL" userId="2f2e9a1aff29c702" providerId="LiveId" clId="{F613443F-DC8E-4D40-B362-51FAAD0F681F}" dt="2025-01-30T17:50:57.759" v="19" actId="26606"/>
-          <ac:spMkLst>
-            <pc:docMk/>
-            <pc:sldMk cId="1256506707" sldId="256"/>
-            <ac:spMk id="37" creationId="{AF2F604E-43BE-4DC3-B983-E071523364F8}"/>
-          </ac:spMkLst>
-        </pc:spChg>
-        <pc:spChg chg="add del">
-          <ac:chgData name="Florent RAVENEL" userId="2f2e9a1aff29c702" providerId="LiveId" clId="{F613443F-DC8E-4D40-B362-51FAAD0F681F}" dt="2025-01-30T17:50:57.759" v="19" actId="26606"/>
-          <ac:spMkLst>
-            <pc:docMk/>
-            <pc:sldMk cId="1256506707" sldId="256"/>
-            <ac:spMk id="38" creationId="{08C9B587-E65E-4B52-B37C-ABEBB6E87928}"/>
-          </ac:spMkLst>
-        </pc:spChg>
-        <pc:spChg chg="add del">
-          <ac:chgData name="Florent RAVENEL" userId="2f2e9a1aff29c702" providerId="LiveId" clId="{F613443F-DC8E-4D40-B362-51FAAD0F681F}" dt="2025-01-30T17:50:57.759" v="19" actId="26606"/>
-          <ac:spMkLst>
-            <pc:docMk/>
-            <pc:sldMk cId="1256506707" sldId="256"/>
-            <ac:spMk id="40" creationId="{5A59F003-E00A-43F9-91DC-CC54E3B87466}"/>
-          </ac:spMkLst>
-        </pc:spChg>
-        <pc:spChg chg="add del">
-          <ac:chgData name="Florent RAVENEL" userId="2f2e9a1aff29c702" providerId="LiveId" clId="{F613443F-DC8E-4D40-B362-51FAAD0F681F}" dt="2025-01-30T17:50:57.759" v="19" actId="26606"/>
-          <ac:spMkLst>
-            <pc:docMk/>
-            <pc:sldMk cId="1256506707" sldId="256"/>
-            <ac:spMk id="41" creationId="{D74A4382-E3AD-430A-9A1F-DFA3E0E77A7D}"/>
-          </ac:spMkLst>
-        </pc:spChg>
-        <pc:spChg chg="add del">
-          <ac:chgData name="Florent RAVENEL" userId="2f2e9a1aff29c702" providerId="LiveId" clId="{F613443F-DC8E-4D40-B362-51FAAD0F681F}" dt="2025-01-30T17:50:16.273" v="10" actId="26606"/>
-          <ac:spMkLst>
-            <pc:docMk/>
-            <pc:sldMk cId="1256506707" sldId="256"/>
-            <ac:spMk id="43" creationId="{27427488-068E-4B55-AC8D-CD070B8CD46D}"/>
-          </ac:spMkLst>
-        </pc:spChg>
-        <pc:spChg chg="add del">
-          <ac:chgData name="Florent RAVENEL" userId="2f2e9a1aff29c702" providerId="LiveId" clId="{F613443F-DC8E-4D40-B362-51FAAD0F681F}" dt="2025-01-30T17:50:57.759" v="19" actId="26606"/>
-          <ac:spMkLst>
-            <pc:docMk/>
-            <pc:sldMk cId="1256506707" sldId="256"/>
-            <ac:spMk id="47" creationId="{79F40191-0F44-4FD1-82CC-ACB507C14BE6}"/>
-          </ac:spMkLst>
-        </pc:spChg>
-        <pc:spChg chg="add del">
-          <ac:chgData name="Florent RAVENEL" userId="2f2e9a1aff29c702" providerId="LiveId" clId="{F613443F-DC8E-4D40-B362-51FAAD0F681F}" dt="2025-01-30T17:50:16.273" v="10" actId="26606"/>
-          <ac:spMkLst>
-            <pc:docMk/>
-            <pc:sldMk cId="1256506707" sldId="256"/>
-            <ac:spMk id="49" creationId="{3FE49A6B-0100-4397-88F8-FE2410D089A8}"/>
-          </ac:spMkLst>
-        </pc:spChg>
-        <pc:spChg chg="add del">
-          <ac:chgData name="Florent RAVENEL" userId="2f2e9a1aff29c702" providerId="LiveId" clId="{F613443F-DC8E-4D40-B362-51FAAD0F681F}" dt="2025-01-30T17:50:16.273" v="10" actId="26606"/>
-          <ac:spMkLst>
-            <pc:docMk/>
-            <pc:sldMk cId="1256506707" sldId="256"/>
-            <ac:spMk id="51" creationId="{A20AF199-99C2-4569-9CAF-24514AE5E82A}"/>
-          </ac:spMkLst>
-        </pc:spChg>
-        <pc:spChg chg="add del">
-          <ac:chgData name="Florent RAVENEL" userId="2f2e9a1aff29c702" providerId="LiveId" clId="{F613443F-DC8E-4D40-B362-51FAAD0F681F}" dt="2025-01-30T17:50:19.004" v="12" actId="26606"/>
-          <ac:spMkLst>
-            <pc:docMk/>
-            <pc:sldMk cId="1256506707" sldId="256"/>
-            <ac:spMk id="53" creationId="{5F18414D-1626-4996-AACB-23D3DE45B03B}"/>
-          </ac:spMkLst>
-        </pc:spChg>
-        <pc:spChg chg="add del">
-          <ac:chgData name="Florent RAVENEL" userId="2f2e9a1aff29c702" providerId="LiveId" clId="{F613443F-DC8E-4D40-B362-51FAAD0F681F}" dt="2025-01-30T17:50:19.004" v="12" actId="26606"/>
-          <ac:spMkLst>
-            <pc:docMk/>
-            <pc:sldMk cId="1256506707" sldId="256"/>
-            <ac:spMk id="55" creationId="{D84C2E9E-0B5D-4B5F-9A1F-70EBDCE39034}"/>
-          </ac:spMkLst>
-        </pc:spChg>
-        <pc:grpChg chg="add del">
-          <ac:chgData name="Florent RAVENEL" userId="2f2e9a1aff29c702" providerId="LiveId" clId="{F613443F-DC8E-4D40-B362-51FAAD0F681F}" dt="2025-01-30T17:46:08.447" v="2" actId="26606"/>
-          <ac:grpSpMkLst>
-            <pc:docMk/>
-            <pc:sldMk cId="1256506707" sldId="256"/>
-            <ac:grpSpMk id="14" creationId="{89D1390B-7E13-4B4F-9CB2-391063412E54}"/>
-          </ac:grpSpMkLst>
-        </pc:grpChg>
-        <pc:picChg chg="add mod ord">
-          <ac:chgData name="Florent RAVENEL" userId="2f2e9a1aff29c702" providerId="LiveId" clId="{F613443F-DC8E-4D40-B362-51FAAD0F681F}" dt="2025-01-30T17:50:57.759" v="19" actId="26606"/>
-          <ac:picMkLst>
-            <pc:docMk/>
-            <pc:sldMk cId="1256506707" sldId="256"/>
-            <ac:picMk id="5" creationId="{24C2E288-0B39-D9EE-30BB-AC7C4E489869}"/>
-          </ac:picMkLst>
-        </pc:picChg>
-        <pc:cxnChg chg="add del">
-          <ac:chgData name="Florent RAVENEL" userId="2f2e9a1aff29c702" providerId="LiveId" clId="{F613443F-DC8E-4D40-B362-51FAAD0F681F}" dt="2025-01-30T17:50:19.004" v="12" actId="26606"/>
-          <ac:cxnSpMkLst>
-            <pc:docMk/>
-            <pc:sldMk cId="1256506707" sldId="256"/>
-            <ac:cxnSpMk id="54" creationId="{07A9243D-8FC3-4B36-874B-55906B03F484}"/>
-          </ac:cxnSpMkLst>
-        </pc:cxnChg>
-      </pc:sldChg>
-      <pc:sldChg chg="addSp delSp modSp mod setBg">
-        <pc:chgData name="Florent RAVENEL" userId="2f2e9a1aff29c702" providerId="LiveId" clId="{F613443F-DC8E-4D40-B362-51FAAD0F681F}" dt="2025-01-30T17:51:07.605" v="20" actId="26606"/>
-        <pc:sldMkLst>
-          <pc:docMk/>
-          <pc:sldMk cId="2627065407" sldId="257"/>
-        </pc:sldMkLst>
-        <pc:spChg chg="mod">
-          <ac:chgData name="Florent RAVENEL" userId="2f2e9a1aff29c702" providerId="LiveId" clId="{F613443F-DC8E-4D40-B362-51FAAD0F681F}" dt="2025-01-30T17:51:07.605" v="20" actId="26606"/>
-          <ac:spMkLst>
-            <pc:docMk/>
-            <pc:sldMk cId="2627065407" sldId="257"/>
-            <ac:spMk id="2" creationId="{DEF16B24-8BEA-F7FD-81A1-3CB673BB86E3}"/>
-          </ac:spMkLst>
-        </pc:spChg>
-        <pc:spChg chg="mod">
-          <ac:chgData name="Florent RAVENEL" userId="2f2e9a1aff29c702" providerId="LiveId" clId="{F613443F-DC8E-4D40-B362-51FAAD0F681F}" dt="2025-01-30T17:51:07.605" v="20" actId="26606"/>
-          <ac:spMkLst>
-            <pc:docMk/>
-            <pc:sldMk cId="2627065407" sldId="257"/>
-            <ac:spMk id="3" creationId="{7AEC15A1-7C6F-782E-1DEC-3D3AC2FCE286}"/>
-          </ac:spMkLst>
-        </pc:spChg>
-        <pc:spChg chg="add del">
-          <ac:chgData name="Florent RAVENEL" userId="2f2e9a1aff29c702" providerId="LiveId" clId="{F613443F-DC8E-4D40-B362-51FAAD0F681F}" dt="2025-01-30T17:51:07.605" v="20" actId="26606"/>
-          <ac:spMkLst>
-            <pc:docMk/>
-            <pc:sldMk cId="2627065407" sldId="257"/>
-            <ac:spMk id="8" creationId="{A7AE9375-4664-4DB2-922D-2782A6E439AC}"/>
-          </ac:spMkLst>
-        </pc:spChg>
-        <pc:spChg chg="add del">
-          <ac:chgData name="Florent RAVENEL" userId="2f2e9a1aff29c702" providerId="LiveId" clId="{F613443F-DC8E-4D40-B362-51FAAD0F681F}" dt="2025-01-30T17:51:07.605" v="20" actId="26606"/>
-          <ac:spMkLst>
-            <pc:docMk/>
-            <pc:sldMk cId="2627065407" sldId="257"/>
-            <ac:spMk id="12" creationId="{9DD005C1-8C51-42D6-9BEE-B9B83849743D}"/>
-          </ac:spMkLst>
-        </pc:spChg>
-        <pc:spChg chg="add del">
-          <ac:chgData name="Florent RAVENEL" userId="2f2e9a1aff29c702" providerId="LiveId" clId="{F613443F-DC8E-4D40-B362-51FAAD0F681F}" dt="2025-01-30T17:51:07.605" v="20" actId="26606"/>
-          <ac:spMkLst>
-            <pc:docMk/>
-            <pc:sldMk cId="2627065407" sldId="257"/>
-            <ac:spMk id="17" creationId="{70DFC902-7D23-471A-B557-B6B6917D7A0D}"/>
-          </ac:spMkLst>
-        </pc:spChg>
-        <pc:spChg chg="add del">
-          <ac:chgData name="Florent RAVENEL" userId="2f2e9a1aff29c702" providerId="LiveId" clId="{F613443F-DC8E-4D40-B362-51FAAD0F681F}" dt="2025-01-30T17:51:07.605" v="20" actId="26606"/>
-          <ac:spMkLst>
-            <pc:docMk/>
-            <pc:sldMk cId="2627065407" sldId="257"/>
-            <ac:spMk id="19" creationId="{A55D5633-D557-4DCA-982C-FF36EB7A1C00}"/>
-          </ac:spMkLst>
-        </pc:spChg>
-        <pc:spChg chg="add del">
-          <ac:chgData name="Florent RAVENEL" userId="2f2e9a1aff29c702" providerId="LiveId" clId="{F613443F-DC8E-4D40-B362-51FAAD0F681F}" dt="2025-01-30T17:51:07.605" v="20" actId="26606"/>
-          <ac:spMkLst>
-            <pc:docMk/>
-            <pc:sldMk cId="2627065407" sldId="257"/>
-            <ac:spMk id="21" creationId="{450D3AD2-FA80-415F-A9CE-54D884561CD7}"/>
-          </ac:spMkLst>
-        </pc:spChg>
-        <pc:cxnChg chg="add del">
-          <ac:chgData name="Florent RAVENEL" userId="2f2e9a1aff29c702" providerId="LiveId" clId="{F613443F-DC8E-4D40-B362-51FAAD0F681F}" dt="2025-01-30T17:51:07.605" v="20" actId="26606"/>
-          <ac:cxnSpMkLst>
-            <pc:docMk/>
-            <pc:sldMk cId="2627065407" sldId="257"/>
-            <ac:cxnSpMk id="10" creationId="{EE504C98-6397-41C1-A8D8-2D9C4ED307E0}"/>
-          </ac:cxnSpMkLst>
-        </pc:cxnChg>
-      </pc:sldChg>
-    </pc:docChg>
-  </pc:docChgLst>
-</pc:chgInfo>
 </file>
 
 <file path=ppt/slideLayouts/slideLayout1.xml><?xml version="1.0" encoding="utf-8"?>
@@ -451,7 +130,7 @@
           <p:cNvPr id="2" name="Title 1">
             <a:extLst>
               <a:ext uri="{FF2B5EF4-FFF2-40B4-BE49-F238E27FC236}">
-                <a16:creationId xmlns:a16="http://schemas.microsoft.com/office/drawing/2014/main" id="{2AFFBCB7-B511-E8EE-E0AB-1E284294D154}"/>
+                <a16:creationId xmlns:a16="http://schemas.microsoft.com/office/drawing/2014/main" id="{C1BFC923-879E-9D1A-C044-20B4F6E3BFCF}"/>
               </a:ext>
             </a:extLst>
           </p:cNvPr>
@@ -488,7 +167,7 @@
           <p:cNvPr id="3" name="Subtitle 2">
             <a:extLst>
               <a:ext uri="{FF2B5EF4-FFF2-40B4-BE49-F238E27FC236}">
-                <a16:creationId xmlns:a16="http://schemas.microsoft.com/office/drawing/2014/main" id="{B1DD33C2-20BA-B673-865D-7F56136E72F1}"/>
+                <a16:creationId xmlns:a16="http://schemas.microsoft.com/office/drawing/2014/main" id="{64E5CCEA-B5F3-43CD-2BC3-CC3E72FD453E}"/>
               </a:ext>
             </a:extLst>
           </p:cNvPr>
@@ -558,7 +237,7 @@
           <p:cNvPr id="4" name="Date Placeholder 3">
             <a:extLst>
               <a:ext uri="{FF2B5EF4-FFF2-40B4-BE49-F238E27FC236}">
-                <a16:creationId xmlns:a16="http://schemas.microsoft.com/office/drawing/2014/main" id="{51F6F5DA-8266-BE4C-72D9-53AA3BADC0D0}"/>
+                <a16:creationId xmlns:a16="http://schemas.microsoft.com/office/drawing/2014/main" id="{0B9F2BC8-1AF6-AF9C-01AC-268ED0398F49}"/>
               </a:ext>
             </a:extLst>
           </p:cNvPr>
@@ -574,9 +253,9 @@
           <a:bodyPr/>
           <a:lstStyle/>
           <a:p>
-            <a:fld id="{819EBBFD-C5B0-4237-8EB7-3C06FAC0B4D4}" type="datetimeFigureOut">
+            <a:fld id="{47BA2DA0-6B40-4D5C-959C-1829054D176C}" type="datetimeFigureOut">
               <a:rPr lang="en-US" smtClean="0"/>
-              <a:t>1/30/2025</a:t>
+              <a:t>2/3/2025</a:t>
             </a:fld>
             <a:endParaRPr lang="en-US"/>
           </a:p>
@@ -587,7 +266,7 @@
           <p:cNvPr id="5" name="Footer Placeholder 4">
             <a:extLst>
               <a:ext uri="{FF2B5EF4-FFF2-40B4-BE49-F238E27FC236}">
-                <a16:creationId xmlns:a16="http://schemas.microsoft.com/office/drawing/2014/main" id="{244D159B-9720-9811-2A96-733FBF03D7EE}"/>
+                <a16:creationId xmlns:a16="http://schemas.microsoft.com/office/drawing/2014/main" id="{4C5962B0-91AD-5324-78C5-A5017A9F47DF}"/>
               </a:ext>
             </a:extLst>
           </p:cNvPr>
@@ -612,7 +291,7 @@
           <p:cNvPr id="6" name="Slide Number Placeholder 5">
             <a:extLst>
               <a:ext uri="{FF2B5EF4-FFF2-40B4-BE49-F238E27FC236}">
-                <a16:creationId xmlns:a16="http://schemas.microsoft.com/office/drawing/2014/main" id="{D24FD922-4DBD-35FF-6B6A-0B25E8C06774}"/>
+                <a16:creationId xmlns:a16="http://schemas.microsoft.com/office/drawing/2014/main" id="{0CA4920A-9B87-CF01-EA59-CA03D3FD6725}"/>
               </a:ext>
             </a:extLst>
           </p:cNvPr>
@@ -628,7 +307,7 @@
           <a:bodyPr/>
           <a:lstStyle/>
           <a:p>
-            <a:fld id="{5EB8AE7A-5D7C-42F9-B0FF-BD6A1C6BD2C9}" type="slidenum">
+            <a:fld id="{5566FF02-50DB-4D95-B327-2A85B84E33F0}" type="slidenum">
               <a:rPr lang="en-US" smtClean="0"/>
               <a:t>‹#›</a:t>
             </a:fld>
@@ -639,7 +318,7 @@
     </p:spTree>
     <p:extLst>
       <p:ext uri="{BB962C8B-B14F-4D97-AF65-F5344CB8AC3E}">
-        <p14:creationId xmlns:p14="http://schemas.microsoft.com/office/powerpoint/2010/main" val="1066573597"/>
+        <p14:creationId xmlns:p14="http://schemas.microsoft.com/office/powerpoint/2010/main" val="1922274378"/>
       </p:ext>
     </p:extLst>
   </p:cSld>
@@ -671,7 +350,7 @@
           <p:cNvPr id="2" name="Title 1">
             <a:extLst>
               <a:ext uri="{FF2B5EF4-FFF2-40B4-BE49-F238E27FC236}">
-                <a16:creationId xmlns:a16="http://schemas.microsoft.com/office/drawing/2014/main" id="{90615D8D-486C-095C-75ED-25DE80F51603}"/>
+                <a16:creationId xmlns:a16="http://schemas.microsoft.com/office/drawing/2014/main" id="{967CCDFB-627A-53A9-479B-D3E61C0D1ED1}"/>
               </a:ext>
             </a:extLst>
           </p:cNvPr>
@@ -699,7 +378,7 @@
           <p:cNvPr id="3" name="Vertical Text Placeholder 2">
             <a:extLst>
               <a:ext uri="{FF2B5EF4-FFF2-40B4-BE49-F238E27FC236}">
-                <a16:creationId xmlns:a16="http://schemas.microsoft.com/office/drawing/2014/main" id="{9158DCD7-CE10-73D1-8843-01D19FC9F489}"/>
+                <a16:creationId xmlns:a16="http://schemas.microsoft.com/office/drawing/2014/main" id="{1B3CA63C-24B6-B1ED-7891-D28751D4AD0A}"/>
               </a:ext>
             </a:extLst>
           </p:cNvPr>
@@ -756,7 +435,7 @@
           <p:cNvPr id="4" name="Date Placeholder 3">
             <a:extLst>
               <a:ext uri="{FF2B5EF4-FFF2-40B4-BE49-F238E27FC236}">
-                <a16:creationId xmlns:a16="http://schemas.microsoft.com/office/drawing/2014/main" id="{FA8A66C9-3558-02EE-2E6D-137CFA28C0CD}"/>
+                <a16:creationId xmlns:a16="http://schemas.microsoft.com/office/drawing/2014/main" id="{AEDD3BF7-7EB9-A748-D127-8CAA830F3BB4}"/>
               </a:ext>
             </a:extLst>
           </p:cNvPr>
@@ -772,9 +451,9 @@
           <a:bodyPr/>
           <a:lstStyle/>
           <a:p>
-            <a:fld id="{819EBBFD-C5B0-4237-8EB7-3C06FAC0B4D4}" type="datetimeFigureOut">
+            <a:fld id="{47BA2DA0-6B40-4D5C-959C-1829054D176C}" type="datetimeFigureOut">
               <a:rPr lang="en-US" smtClean="0"/>
-              <a:t>1/30/2025</a:t>
+              <a:t>2/3/2025</a:t>
             </a:fld>
             <a:endParaRPr lang="en-US"/>
           </a:p>
@@ -785,7 +464,7 @@
           <p:cNvPr id="5" name="Footer Placeholder 4">
             <a:extLst>
               <a:ext uri="{FF2B5EF4-FFF2-40B4-BE49-F238E27FC236}">
-                <a16:creationId xmlns:a16="http://schemas.microsoft.com/office/drawing/2014/main" id="{37F0863A-E930-4145-9145-0596D12135A7}"/>
+                <a16:creationId xmlns:a16="http://schemas.microsoft.com/office/drawing/2014/main" id="{32755CDE-2F32-FC45-17A2-0C79534B2AE5}"/>
               </a:ext>
             </a:extLst>
           </p:cNvPr>
@@ -810,7 +489,7 @@
           <p:cNvPr id="6" name="Slide Number Placeholder 5">
             <a:extLst>
               <a:ext uri="{FF2B5EF4-FFF2-40B4-BE49-F238E27FC236}">
-                <a16:creationId xmlns:a16="http://schemas.microsoft.com/office/drawing/2014/main" id="{54F9A091-45B3-1CBB-6C8B-4AE61FB18FAB}"/>
+                <a16:creationId xmlns:a16="http://schemas.microsoft.com/office/drawing/2014/main" id="{A18C5CE8-48E2-ADD3-EA5B-2FB6956F984E}"/>
               </a:ext>
             </a:extLst>
           </p:cNvPr>
@@ -826,7 +505,7 @@
           <a:bodyPr/>
           <a:lstStyle/>
           <a:p>
-            <a:fld id="{5EB8AE7A-5D7C-42F9-B0FF-BD6A1C6BD2C9}" type="slidenum">
+            <a:fld id="{5566FF02-50DB-4D95-B327-2A85B84E33F0}" type="slidenum">
               <a:rPr lang="en-US" smtClean="0"/>
               <a:t>‹#›</a:t>
             </a:fld>
@@ -837,7 +516,7 @@
     </p:spTree>
     <p:extLst>
       <p:ext uri="{BB962C8B-B14F-4D97-AF65-F5344CB8AC3E}">
-        <p14:creationId xmlns:p14="http://schemas.microsoft.com/office/powerpoint/2010/main" val="2912533488"/>
+        <p14:creationId xmlns:p14="http://schemas.microsoft.com/office/powerpoint/2010/main" val="508222421"/>
       </p:ext>
     </p:extLst>
   </p:cSld>
@@ -869,7 +548,7 @@
           <p:cNvPr id="2" name="Vertical Title 1">
             <a:extLst>
               <a:ext uri="{FF2B5EF4-FFF2-40B4-BE49-F238E27FC236}">
-                <a16:creationId xmlns:a16="http://schemas.microsoft.com/office/drawing/2014/main" id="{B471C261-B868-267D-08A5-0BFDCA7A3B99}"/>
+                <a16:creationId xmlns:a16="http://schemas.microsoft.com/office/drawing/2014/main" id="{0A037669-45DE-85AB-6E86-603BBE176DEC}"/>
               </a:ext>
             </a:extLst>
           </p:cNvPr>
@@ -902,7 +581,7 @@
           <p:cNvPr id="3" name="Vertical Text Placeholder 2">
             <a:extLst>
               <a:ext uri="{FF2B5EF4-FFF2-40B4-BE49-F238E27FC236}">
-                <a16:creationId xmlns:a16="http://schemas.microsoft.com/office/drawing/2014/main" id="{162B8D72-5F18-3E7A-C895-CCDD8E252A1C}"/>
+                <a16:creationId xmlns:a16="http://schemas.microsoft.com/office/drawing/2014/main" id="{DBD01610-AB11-2130-76DB-1545FB1E524C}"/>
               </a:ext>
             </a:extLst>
           </p:cNvPr>
@@ -964,7 +643,7 @@
           <p:cNvPr id="4" name="Date Placeholder 3">
             <a:extLst>
               <a:ext uri="{FF2B5EF4-FFF2-40B4-BE49-F238E27FC236}">
-                <a16:creationId xmlns:a16="http://schemas.microsoft.com/office/drawing/2014/main" id="{E45C7101-6939-B0ED-4E9F-394A2E0434F0}"/>
+                <a16:creationId xmlns:a16="http://schemas.microsoft.com/office/drawing/2014/main" id="{15C15575-B9D8-3153-6A84-61CCB606AF18}"/>
               </a:ext>
             </a:extLst>
           </p:cNvPr>
@@ -980,9 +659,9 @@
           <a:bodyPr/>
           <a:lstStyle/>
           <a:p>
-            <a:fld id="{819EBBFD-C5B0-4237-8EB7-3C06FAC0B4D4}" type="datetimeFigureOut">
+            <a:fld id="{47BA2DA0-6B40-4D5C-959C-1829054D176C}" type="datetimeFigureOut">
               <a:rPr lang="en-US" smtClean="0"/>
-              <a:t>1/30/2025</a:t>
+              <a:t>2/3/2025</a:t>
             </a:fld>
             <a:endParaRPr lang="en-US"/>
           </a:p>
@@ -993,7 +672,7 @@
           <p:cNvPr id="5" name="Footer Placeholder 4">
             <a:extLst>
               <a:ext uri="{FF2B5EF4-FFF2-40B4-BE49-F238E27FC236}">
-                <a16:creationId xmlns:a16="http://schemas.microsoft.com/office/drawing/2014/main" id="{DA363872-147D-7531-F97E-BE7E0238614A}"/>
+                <a16:creationId xmlns:a16="http://schemas.microsoft.com/office/drawing/2014/main" id="{2F9415B1-02FA-8004-46DF-4BB7A8F48DD4}"/>
               </a:ext>
             </a:extLst>
           </p:cNvPr>
@@ -1018,7 +697,7 @@
           <p:cNvPr id="6" name="Slide Number Placeholder 5">
             <a:extLst>
               <a:ext uri="{FF2B5EF4-FFF2-40B4-BE49-F238E27FC236}">
-                <a16:creationId xmlns:a16="http://schemas.microsoft.com/office/drawing/2014/main" id="{79E8A31B-89E2-3BC9-AA51-FA0E7D8A4550}"/>
+                <a16:creationId xmlns:a16="http://schemas.microsoft.com/office/drawing/2014/main" id="{4047B53D-4F8F-6986-4F50-7D6FB019CFE7}"/>
               </a:ext>
             </a:extLst>
           </p:cNvPr>
@@ -1034,7 +713,7 @@
           <a:bodyPr/>
           <a:lstStyle/>
           <a:p>
-            <a:fld id="{5EB8AE7A-5D7C-42F9-B0FF-BD6A1C6BD2C9}" type="slidenum">
+            <a:fld id="{5566FF02-50DB-4D95-B327-2A85B84E33F0}" type="slidenum">
               <a:rPr lang="en-US" smtClean="0"/>
               <a:t>‹#›</a:t>
             </a:fld>
@@ -1045,7 +724,7 @@
     </p:spTree>
     <p:extLst>
       <p:ext uri="{BB962C8B-B14F-4D97-AF65-F5344CB8AC3E}">
-        <p14:creationId xmlns:p14="http://schemas.microsoft.com/office/powerpoint/2010/main" val="1744671906"/>
+        <p14:creationId xmlns:p14="http://schemas.microsoft.com/office/powerpoint/2010/main" val="2488948003"/>
       </p:ext>
     </p:extLst>
   </p:cSld>
@@ -1077,7 +756,7 @@
           <p:cNvPr id="2" name="Title 1">
             <a:extLst>
               <a:ext uri="{FF2B5EF4-FFF2-40B4-BE49-F238E27FC236}">
-                <a16:creationId xmlns:a16="http://schemas.microsoft.com/office/drawing/2014/main" id="{7489939B-B44C-318A-3031-C00FF87DE1AA}"/>
+                <a16:creationId xmlns:a16="http://schemas.microsoft.com/office/drawing/2014/main" id="{E7883517-29F2-8D2B-9F68-6EF08AF54525}"/>
               </a:ext>
             </a:extLst>
           </p:cNvPr>
@@ -1105,7 +784,7 @@
           <p:cNvPr id="3" name="Content Placeholder 2">
             <a:extLst>
               <a:ext uri="{FF2B5EF4-FFF2-40B4-BE49-F238E27FC236}">
-                <a16:creationId xmlns:a16="http://schemas.microsoft.com/office/drawing/2014/main" id="{2E6D9D7E-E4F6-BF1D-582A-5252CAF04143}"/>
+                <a16:creationId xmlns:a16="http://schemas.microsoft.com/office/drawing/2014/main" id="{FABBCE62-FFA5-529A-C841-92F24A958137}"/>
               </a:ext>
             </a:extLst>
           </p:cNvPr>
@@ -1162,7 +841,7 @@
           <p:cNvPr id="4" name="Date Placeholder 3">
             <a:extLst>
               <a:ext uri="{FF2B5EF4-FFF2-40B4-BE49-F238E27FC236}">
-                <a16:creationId xmlns:a16="http://schemas.microsoft.com/office/drawing/2014/main" id="{33F6FDEA-F61D-CEE5-824F-96BF42BC5466}"/>
+                <a16:creationId xmlns:a16="http://schemas.microsoft.com/office/drawing/2014/main" id="{126BEE4E-5679-7CC2-3545-AB0B84951D1C}"/>
               </a:ext>
             </a:extLst>
           </p:cNvPr>
@@ -1178,9 +857,9 @@
           <a:bodyPr/>
           <a:lstStyle/>
           <a:p>
-            <a:fld id="{819EBBFD-C5B0-4237-8EB7-3C06FAC0B4D4}" type="datetimeFigureOut">
+            <a:fld id="{47BA2DA0-6B40-4D5C-959C-1829054D176C}" type="datetimeFigureOut">
               <a:rPr lang="en-US" smtClean="0"/>
-              <a:t>1/30/2025</a:t>
+              <a:t>2/3/2025</a:t>
             </a:fld>
             <a:endParaRPr lang="en-US"/>
           </a:p>
@@ -1191,7 +870,7 @@
           <p:cNvPr id="5" name="Footer Placeholder 4">
             <a:extLst>
               <a:ext uri="{FF2B5EF4-FFF2-40B4-BE49-F238E27FC236}">
-                <a16:creationId xmlns:a16="http://schemas.microsoft.com/office/drawing/2014/main" id="{45722DE4-CB51-CB1D-B05A-9CB12A4FFC9B}"/>
+                <a16:creationId xmlns:a16="http://schemas.microsoft.com/office/drawing/2014/main" id="{8A9AB163-1410-F057-AA70-0873B973CB91}"/>
               </a:ext>
             </a:extLst>
           </p:cNvPr>
@@ -1216,7 +895,7 @@
           <p:cNvPr id="6" name="Slide Number Placeholder 5">
             <a:extLst>
               <a:ext uri="{FF2B5EF4-FFF2-40B4-BE49-F238E27FC236}">
-                <a16:creationId xmlns:a16="http://schemas.microsoft.com/office/drawing/2014/main" id="{610B1E05-927B-F1CB-53EB-858DC2F5BAF7}"/>
+                <a16:creationId xmlns:a16="http://schemas.microsoft.com/office/drawing/2014/main" id="{C6957961-ACB0-A3BB-60CF-3EAC492D73AE}"/>
               </a:ext>
             </a:extLst>
           </p:cNvPr>
@@ -1232,7 +911,7 @@
           <a:bodyPr/>
           <a:lstStyle/>
           <a:p>
-            <a:fld id="{5EB8AE7A-5D7C-42F9-B0FF-BD6A1C6BD2C9}" type="slidenum">
+            <a:fld id="{5566FF02-50DB-4D95-B327-2A85B84E33F0}" type="slidenum">
               <a:rPr lang="en-US" smtClean="0"/>
               <a:t>‹#›</a:t>
             </a:fld>
@@ -1243,7 +922,7 @@
     </p:spTree>
     <p:extLst>
       <p:ext uri="{BB962C8B-B14F-4D97-AF65-F5344CB8AC3E}">
-        <p14:creationId xmlns:p14="http://schemas.microsoft.com/office/powerpoint/2010/main" val="3589075269"/>
+        <p14:creationId xmlns:p14="http://schemas.microsoft.com/office/powerpoint/2010/main" val="1061429986"/>
       </p:ext>
     </p:extLst>
   </p:cSld>
@@ -1275,7 +954,7 @@
           <p:cNvPr id="2" name="Title 1">
             <a:extLst>
               <a:ext uri="{FF2B5EF4-FFF2-40B4-BE49-F238E27FC236}">
-                <a16:creationId xmlns:a16="http://schemas.microsoft.com/office/drawing/2014/main" id="{BDB18B29-66EF-2704-B907-C54A4F4B1500}"/>
+                <a16:creationId xmlns:a16="http://schemas.microsoft.com/office/drawing/2014/main" id="{F2A231DC-54AC-1373-8D2C-DA085A777CC9}"/>
               </a:ext>
             </a:extLst>
           </p:cNvPr>
@@ -1312,7 +991,7 @@
           <p:cNvPr id="3" name="Text Placeholder 2">
             <a:extLst>
               <a:ext uri="{FF2B5EF4-FFF2-40B4-BE49-F238E27FC236}">
-                <a16:creationId xmlns:a16="http://schemas.microsoft.com/office/drawing/2014/main" id="{88976BEC-22CE-13C6-EDDA-C73D61B4B5A0}"/>
+                <a16:creationId xmlns:a16="http://schemas.microsoft.com/office/drawing/2014/main" id="{CC600FEF-2A25-C8D8-CB8B-7D680E3FB612}"/>
               </a:ext>
             </a:extLst>
           </p:cNvPr>
@@ -1437,7 +1116,7 @@
           <p:cNvPr id="4" name="Date Placeholder 3">
             <a:extLst>
               <a:ext uri="{FF2B5EF4-FFF2-40B4-BE49-F238E27FC236}">
-                <a16:creationId xmlns:a16="http://schemas.microsoft.com/office/drawing/2014/main" id="{31D9C101-61EB-E761-A1F8-D5986BE26919}"/>
+                <a16:creationId xmlns:a16="http://schemas.microsoft.com/office/drawing/2014/main" id="{5E938F85-19F1-1117-05E1-06F47660749D}"/>
               </a:ext>
             </a:extLst>
           </p:cNvPr>
@@ -1453,9 +1132,9 @@
           <a:bodyPr/>
           <a:lstStyle/>
           <a:p>
-            <a:fld id="{819EBBFD-C5B0-4237-8EB7-3C06FAC0B4D4}" type="datetimeFigureOut">
+            <a:fld id="{47BA2DA0-6B40-4D5C-959C-1829054D176C}" type="datetimeFigureOut">
               <a:rPr lang="en-US" smtClean="0"/>
-              <a:t>1/30/2025</a:t>
+              <a:t>2/3/2025</a:t>
             </a:fld>
             <a:endParaRPr lang="en-US"/>
           </a:p>
@@ -1466,7 +1145,7 @@
           <p:cNvPr id="5" name="Footer Placeholder 4">
             <a:extLst>
               <a:ext uri="{FF2B5EF4-FFF2-40B4-BE49-F238E27FC236}">
-                <a16:creationId xmlns:a16="http://schemas.microsoft.com/office/drawing/2014/main" id="{310AE1F7-A370-7FC6-D8AB-4C3208795FEA}"/>
+                <a16:creationId xmlns:a16="http://schemas.microsoft.com/office/drawing/2014/main" id="{95A2F30D-09E8-A08F-0A08-20D4F64FAD82}"/>
               </a:ext>
             </a:extLst>
           </p:cNvPr>
@@ -1491,7 +1170,7 @@
           <p:cNvPr id="6" name="Slide Number Placeholder 5">
             <a:extLst>
               <a:ext uri="{FF2B5EF4-FFF2-40B4-BE49-F238E27FC236}">
-                <a16:creationId xmlns:a16="http://schemas.microsoft.com/office/drawing/2014/main" id="{ACB38C53-3472-1773-7C45-98B05BE1EE51}"/>
+                <a16:creationId xmlns:a16="http://schemas.microsoft.com/office/drawing/2014/main" id="{AC9A464C-9BF9-D98D-B102-24A6FC304FC4}"/>
               </a:ext>
             </a:extLst>
           </p:cNvPr>
@@ -1507,7 +1186,7 @@
           <a:bodyPr/>
           <a:lstStyle/>
           <a:p>
-            <a:fld id="{5EB8AE7A-5D7C-42F9-B0FF-BD6A1C6BD2C9}" type="slidenum">
+            <a:fld id="{5566FF02-50DB-4D95-B327-2A85B84E33F0}" type="slidenum">
               <a:rPr lang="en-US" smtClean="0"/>
               <a:t>‹#›</a:t>
             </a:fld>
@@ -1518,7 +1197,7 @@
     </p:spTree>
     <p:extLst>
       <p:ext uri="{BB962C8B-B14F-4D97-AF65-F5344CB8AC3E}">
-        <p14:creationId xmlns:p14="http://schemas.microsoft.com/office/powerpoint/2010/main" val="4000440559"/>
+        <p14:creationId xmlns:p14="http://schemas.microsoft.com/office/powerpoint/2010/main" val="17660345"/>
       </p:ext>
     </p:extLst>
   </p:cSld>
@@ -1550,7 +1229,7 @@
           <p:cNvPr id="2" name="Title 1">
             <a:extLst>
               <a:ext uri="{FF2B5EF4-FFF2-40B4-BE49-F238E27FC236}">
-                <a16:creationId xmlns:a16="http://schemas.microsoft.com/office/drawing/2014/main" id="{A0C70609-3A23-CB58-A8FA-D4AB950F7314}"/>
+                <a16:creationId xmlns:a16="http://schemas.microsoft.com/office/drawing/2014/main" id="{5667C3FD-6B97-955D-D2E4-13A37C37D782}"/>
               </a:ext>
             </a:extLst>
           </p:cNvPr>
@@ -1578,7 +1257,7 @@
           <p:cNvPr id="3" name="Content Placeholder 2">
             <a:extLst>
               <a:ext uri="{FF2B5EF4-FFF2-40B4-BE49-F238E27FC236}">
-                <a16:creationId xmlns:a16="http://schemas.microsoft.com/office/drawing/2014/main" id="{A6E79C27-E00B-7F5C-444E-E1B066B0C570}"/>
+                <a16:creationId xmlns:a16="http://schemas.microsoft.com/office/drawing/2014/main" id="{36286E87-F9EB-ACBE-AEEE-DF6C071D3343}"/>
               </a:ext>
             </a:extLst>
           </p:cNvPr>
@@ -1640,7 +1319,7 @@
           <p:cNvPr id="4" name="Content Placeholder 3">
             <a:extLst>
               <a:ext uri="{FF2B5EF4-FFF2-40B4-BE49-F238E27FC236}">
-                <a16:creationId xmlns:a16="http://schemas.microsoft.com/office/drawing/2014/main" id="{5BCBD3F5-E985-1281-462D-A82EEADBD657}"/>
+                <a16:creationId xmlns:a16="http://schemas.microsoft.com/office/drawing/2014/main" id="{9BEAE065-FD6E-9DBF-329F-E5B4F630F806}"/>
               </a:ext>
             </a:extLst>
           </p:cNvPr>
@@ -1702,7 +1381,7 @@
           <p:cNvPr id="5" name="Date Placeholder 4">
             <a:extLst>
               <a:ext uri="{FF2B5EF4-FFF2-40B4-BE49-F238E27FC236}">
-                <a16:creationId xmlns:a16="http://schemas.microsoft.com/office/drawing/2014/main" id="{B4CA8BFC-029D-B19B-CF3E-0E9098D13A4C}"/>
+                <a16:creationId xmlns:a16="http://schemas.microsoft.com/office/drawing/2014/main" id="{1C35FE96-51E6-06D3-2E75-576F4EC201A1}"/>
               </a:ext>
             </a:extLst>
           </p:cNvPr>
@@ -1718,9 +1397,9 @@
           <a:bodyPr/>
           <a:lstStyle/>
           <a:p>
-            <a:fld id="{819EBBFD-C5B0-4237-8EB7-3C06FAC0B4D4}" type="datetimeFigureOut">
+            <a:fld id="{47BA2DA0-6B40-4D5C-959C-1829054D176C}" type="datetimeFigureOut">
               <a:rPr lang="en-US" smtClean="0"/>
-              <a:t>1/30/2025</a:t>
+              <a:t>2/3/2025</a:t>
             </a:fld>
             <a:endParaRPr lang="en-US"/>
           </a:p>
@@ -1731,7 +1410,7 @@
           <p:cNvPr id="6" name="Footer Placeholder 5">
             <a:extLst>
               <a:ext uri="{FF2B5EF4-FFF2-40B4-BE49-F238E27FC236}">
-                <a16:creationId xmlns:a16="http://schemas.microsoft.com/office/drawing/2014/main" id="{6CAE7A8A-FC5B-9FC9-7F70-0DC7CA68473F}"/>
+                <a16:creationId xmlns:a16="http://schemas.microsoft.com/office/drawing/2014/main" id="{24E6F141-4F66-5FF7-ED66-352BC0162539}"/>
               </a:ext>
             </a:extLst>
           </p:cNvPr>
@@ -1756,7 +1435,7 @@
           <p:cNvPr id="7" name="Slide Number Placeholder 6">
             <a:extLst>
               <a:ext uri="{FF2B5EF4-FFF2-40B4-BE49-F238E27FC236}">
-                <a16:creationId xmlns:a16="http://schemas.microsoft.com/office/drawing/2014/main" id="{4A216C84-FA04-40FA-B1EF-939AB17024CB}"/>
+                <a16:creationId xmlns:a16="http://schemas.microsoft.com/office/drawing/2014/main" id="{3F70C4A3-F306-A51D-B04F-F23AF0CDCE53}"/>
               </a:ext>
             </a:extLst>
           </p:cNvPr>
@@ -1772,7 +1451,7 @@
           <a:bodyPr/>
           <a:lstStyle/>
           <a:p>
-            <a:fld id="{5EB8AE7A-5D7C-42F9-B0FF-BD6A1C6BD2C9}" type="slidenum">
+            <a:fld id="{5566FF02-50DB-4D95-B327-2A85B84E33F0}" type="slidenum">
               <a:rPr lang="en-US" smtClean="0"/>
               <a:t>‹#›</a:t>
             </a:fld>
@@ -1783,7 +1462,7 @@
     </p:spTree>
     <p:extLst>
       <p:ext uri="{BB962C8B-B14F-4D97-AF65-F5344CB8AC3E}">
-        <p14:creationId xmlns:p14="http://schemas.microsoft.com/office/powerpoint/2010/main" val="594493723"/>
+        <p14:creationId xmlns:p14="http://schemas.microsoft.com/office/powerpoint/2010/main" val="2831173972"/>
       </p:ext>
     </p:extLst>
   </p:cSld>
@@ -1815,7 +1494,7 @@
           <p:cNvPr id="2" name="Title 1">
             <a:extLst>
               <a:ext uri="{FF2B5EF4-FFF2-40B4-BE49-F238E27FC236}">
-                <a16:creationId xmlns:a16="http://schemas.microsoft.com/office/drawing/2014/main" id="{9DC46FCE-D2E3-39E7-3C0D-DF7DDF9BA102}"/>
+                <a16:creationId xmlns:a16="http://schemas.microsoft.com/office/drawing/2014/main" id="{7E317442-FC29-3A1A-DE9D-40C810EA4410}"/>
               </a:ext>
             </a:extLst>
           </p:cNvPr>
@@ -1848,7 +1527,7 @@
           <p:cNvPr id="3" name="Text Placeholder 2">
             <a:extLst>
               <a:ext uri="{FF2B5EF4-FFF2-40B4-BE49-F238E27FC236}">
-                <a16:creationId xmlns:a16="http://schemas.microsoft.com/office/drawing/2014/main" id="{7B9E896B-8F64-EC05-DFA4-5D9E691880AC}"/>
+                <a16:creationId xmlns:a16="http://schemas.microsoft.com/office/drawing/2014/main" id="{4F557564-2CD3-6A6C-1434-5E892A485137}"/>
               </a:ext>
             </a:extLst>
           </p:cNvPr>
@@ -1919,7 +1598,7 @@
           <p:cNvPr id="4" name="Content Placeholder 3">
             <a:extLst>
               <a:ext uri="{FF2B5EF4-FFF2-40B4-BE49-F238E27FC236}">
-                <a16:creationId xmlns:a16="http://schemas.microsoft.com/office/drawing/2014/main" id="{1740C69D-BCB6-D811-D332-3355B1F456E1}"/>
+                <a16:creationId xmlns:a16="http://schemas.microsoft.com/office/drawing/2014/main" id="{27D87BF7-5781-987C-0656-58E8EE91E9C8}"/>
               </a:ext>
             </a:extLst>
           </p:cNvPr>
@@ -1981,7 +1660,7 @@
           <p:cNvPr id="5" name="Text Placeholder 4">
             <a:extLst>
               <a:ext uri="{FF2B5EF4-FFF2-40B4-BE49-F238E27FC236}">
-                <a16:creationId xmlns:a16="http://schemas.microsoft.com/office/drawing/2014/main" id="{68AE5977-C835-5451-4C96-67C54EAC8C2D}"/>
+                <a16:creationId xmlns:a16="http://schemas.microsoft.com/office/drawing/2014/main" id="{9AE0C70A-ABB6-BEEB-EEBC-87E76603E27B}"/>
               </a:ext>
             </a:extLst>
           </p:cNvPr>
@@ -2052,7 +1731,7 @@
           <p:cNvPr id="6" name="Content Placeholder 5">
             <a:extLst>
               <a:ext uri="{FF2B5EF4-FFF2-40B4-BE49-F238E27FC236}">
-                <a16:creationId xmlns:a16="http://schemas.microsoft.com/office/drawing/2014/main" id="{B84CCFEA-0CD5-7F22-BB21-24A525252568}"/>
+                <a16:creationId xmlns:a16="http://schemas.microsoft.com/office/drawing/2014/main" id="{AF0437FF-6730-D1D9-D70E-FEDC0B4D96DA}"/>
               </a:ext>
             </a:extLst>
           </p:cNvPr>
@@ -2114,7 +1793,7 @@
           <p:cNvPr id="7" name="Date Placeholder 6">
             <a:extLst>
               <a:ext uri="{FF2B5EF4-FFF2-40B4-BE49-F238E27FC236}">
-                <a16:creationId xmlns:a16="http://schemas.microsoft.com/office/drawing/2014/main" id="{1EB9C9C3-E9CD-4BE9-6CAD-54FEC97AA93C}"/>
+                <a16:creationId xmlns:a16="http://schemas.microsoft.com/office/drawing/2014/main" id="{94AB399E-09E0-9D8D-67BF-303128DB8A6C}"/>
               </a:ext>
             </a:extLst>
           </p:cNvPr>
@@ -2130,9 +1809,9 @@
           <a:bodyPr/>
           <a:lstStyle/>
           <a:p>
-            <a:fld id="{819EBBFD-C5B0-4237-8EB7-3C06FAC0B4D4}" type="datetimeFigureOut">
+            <a:fld id="{47BA2DA0-6B40-4D5C-959C-1829054D176C}" type="datetimeFigureOut">
               <a:rPr lang="en-US" smtClean="0"/>
-              <a:t>1/30/2025</a:t>
+              <a:t>2/3/2025</a:t>
             </a:fld>
             <a:endParaRPr lang="en-US"/>
           </a:p>
@@ -2143,7 +1822,7 @@
           <p:cNvPr id="8" name="Footer Placeholder 7">
             <a:extLst>
               <a:ext uri="{FF2B5EF4-FFF2-40B4-BE49-F238E27FC236}">
-                <a16:creationId xmlns:a16="http://schemas.microsoft.com/office/drawing/2014/main" id="{25C31377-D09D-8244-274F-4AF2AE2DCC35}"/>
+                <a16:creationId xmlns:a16="http://schemas.microsoft.com/office/drawing/2014/main" id="{9D423C52-9560-23E4-4436-EAFB949371DF}"/>
               </a:ext>
             </a:extLst>
           </p:cNvPr>
@@ -2168,7 +1847,7 @@
           <p:cNvPr id="9" name="Slide Number Placeholder 8">
             <a:extLst>
               <a:ext uri="{FF2B5EF4-FFF2-40B4-BE49-F238E27FC236}">
-                <a16:creationId xmlns:a16="http://schemas.microsoft.com/office/drawing/2014/main" id="{E63F7102-663B-93F8-26A6-214978BFF083}"/>
+                <a16:creationId xmlns:a16="http://schemas.microsoft.com/office/drawing/2014/main" id="{2BAB97DF-9675-76A6-E8E3-781FF693BB58}"/>
               </a:ext>
             </a:extLst>
           </p:cNvPr>
@@ -2184,7 +1863,7 @@
           <a:bodyPr/>
           <a:lstStyle/>
           <a:p>
-            <a:fld id="{5EB8AE7A-5D7C-42F9-B0FF-BD6A1C6BD2C9}" type="slidenum">
+            <a:fld id="{5566FF02-50DB-4D95-B327-2A85B84E33F0}" type="slidenum">
               <a:rPr lang="en-US" smtClean="0"/>
               <a:t>‹#›</a:t>
             </a:fld>
@@ -2195,7 +1874,7 @@
     </p:spTree>
     <p:extLst>
       <p:ext uri="{BB962C8B-B14F-4D97-AF65-F5344CB8AC3E}">
-        <p14:creationId xmlns:p14="http://schemas.microsoft.com/office/powerpoint/2010/main" val="2454645457"/>
+        <p14:creationId xmlns:p14="http://schemas.microsoft.com/office/powerpoint/2010/main" val="735421952"/>
       </p:ext>
     </p:extLst>
   </p:cSld>
@@ -2227,7 +1906,7 @@
           <p:cNvPr id="2" name="Title 1">
             <a:extLst>
               <a:ext uri="{FF2B5EF4-FFF2-40B4-BE49-F238E27FC236}">
-                <a16:creationId xmlns:a16="http://schemas.microsoft.com/office/drawing/2014/main" id="{C153C258-230F-0555-AE1E-B9E76EE7A58C}"/>
+                <a16:creationId xmlns:a16="http://schemas.microsoft.com/office/drawing/2014/main" id="{B580723A-3310-43DA-AB78-FC1FFD1BE46D}"/>
               </a:ext>
             </a:extLst>
           </p:cNvPr>
@@ -2255,7 +1934,7 @@
           <p:cNvPr id="3" name="Date Placeholder 2">
             <a:extLst>
               <a:ext uri="{FF2B5EF4-FFF2-40B4-BE49-F238E27FC236}">
-                <a16:creationId xmlns:a16="http://schemas.microsoft.com/office/drawing/2014/main" id="{77DAC90E-3D0F-0311-B590-A6BD63E8BF27}"/>
+                <a16:creationId xmlns:a16="http://schemas.microsoft.com/office/drawing/2014/main" id="{7D415056-824A-7BDA-B588-DE0A9C0B71A2}"/>
               </a:ext>
             </a:extLst>
           </p:cNvPr>
@@ -2271,9 +1950,9 @@
           <a:bodyPr/>
           <a:lstStyle/>
           <a:p>
-            <a:fld id="{819EBBFD-C5B0-4237-8EB7-3C06FAC0B4D4}" type="datetimeFigureOut">
+            <a:fld id="{47BA2DA0-6B40-4D5C-959C-1829054D176C}" type="datetimeFigureOut">
               <a:rPr lang="en-US" smtClean="0"/>
-              <a:t>1/30/2025</a:t>
+              <a:t>2/3/2025</a:t>
             </a:fld>
             <a:endParaRPr lang="en-US"/>
           </a:p>
@@ -2284,7 +1963,7 @@
           <p:cNvPr id="4" name="Footer Placeholder 3">
             <a:extLst>
               <a:ext uri="{FF2B5EF4-FFF2-40B4-BE49-F238E27FC236}">
-                <a16:creationId xmlns:a16="http://schemas.microsoft.com/office/drawing/2014/main" id="{BFB8078E-FCBE-244B-4D68-FF685D4A2DC9}"/>
+                <a16:creationId xmlns:a16="http://schemas.microsoft.com/office/drawing/2014/main" id="{85B8533D-B85A-42FE-5065-71E78783B8F8}"/>
               </a:ext>
             </a:extLst>
           </p:cNvPr>
@@ -2309,7 +1988,7 @@
           <p:cNvPr id="5" name="Slide Number Placeholder 4">
             <a:extLst>
               <a:ext uri="{FF2B5EF4-FFF2-40B4-BE49-F238E27FC236}">
-                <a16:creationId xmlns:a16="http://schemas.microsoft.com/office/drawing/2014/main" id="{CC48E5C1-4ACE-2DF0-BFC0-5B83D5E49A27}"/>
+                <a16:creationId xmlns:a16="http://schemas.microsoft.com/office/drawing/2014/main" id="{D93CAE48-E5C1-AC08-0720-3EEEF110C64E}"/>
               </a:ext>
             </a:extLst>
           </p:cNvPr>
@@ -2325,7 +2004,7 @@
           <a:bodyPr/>
           <a:lstStyle/>
           <a:p>
-            <a:fld id="{5EB8AE7A-5D7C-42F9-B0FF-BD6A1C6BD2C9}" type="slidenum">
+            <a:fld id="{5566FF02-50DB-4D95-B327-2A85B84E33F0}" type="slidenum">
               <a:rPr lang="en-US" smtClean="0"/>
               <a:t>‹#›</a:t>
             </a:fld>
@@ -2336,7 +2015,7 @@
     </p:spTree>
     <p:extLst>
       <p:ext uri="{BB962C8B-B14F-4D97-AF65-F5344CB8AC3E}">
-        <p14:creationId xmlns:p14="http://schemas.microsoft.com/office/powerpoint/2010/main" val="4128437838"/>
+        <p14:creationId xmlns:p14="http://schemas.microsoft.com/office/powerpoint/2010/main" val="638514211"/>
       </p:ext>
     </p:extLst>
   </p:cSld>
@@ -2368,7 +2047,7 @@
           <p:cNvPr id="2" name="Date Placeholder 1">
             <a:extLst>
               <a:ext uri="{FF2B5EF4-FFF2-40B4-BE49-F238E27FC236}">
-                <a16:creationId xmlns:a16="http://schemas.microsoft.com/office/drawing/2014/main" id="{B9AC7086-9FF0-F2B3-0050-F3F11F1F38D4}"/>
+                <a16:creationId xmlns:a16="http://schemas.microsoft.com/office/drawing/2014/main" id="{8D40633F-5D23-3C21-ABAF-45E4518ACA09}"/>
               </a:ext>
             </a:extLst>
           </p:cNvPr>
@@ -2384,9 +2063,9 @@
           <a:bodyPr/>
           <a:lstStyle/>
           <a:p>
-            <a:fld id="{819EBBFD-C5B0-4237-8EB7-3C06FAC0B4D4}" type="datetimeFigureOut">
+            <a:fld id="{47BA2DA0-6B40-4D5C-959C-1829054D176C}" type="datetimeFigureOut">
               <a:rPr lang="en-US" smtClean="0"/>
-              <a:t>1/30/2025</a:t>
+              <a:t>2/3/2025</a:t>
             </a:fld>
             <a:endParaRPr lang="en-US"/>
           </a:p>
@@ -2397,7 +2076,7 @@
           <p:cNvPr id="3" name="Footer Placeholder 2">
             <a:extLst>
               <a:ext uri="{FF2B5EF4-FFF2-40B4-BE49-F238E27FC236}">
-                <a16:creationId xmlns:a16="http://schemas.microsoft.com/office/drawing/2014/main" id="{09D8667A-DEB3-FFFA-B990-29B830C99D3B}"/>
+                <a16:creationId xmlns:a16="http://schemas.microsoft.com/office/drawing/2014/main" id="{ED6CB9B3-CC64-66D4-0DB3-2111B6BFB3CA}"/>
               </a:ext>
             </a:extLst>
           </p:cNvPr>
@@ -2422,7 +2101,7 @@
           <p:cNvPr id="4" name="Slide Number Placeholder 3">
             <a:extLst>
               <a:ext uri="{FF2B5EF4-FFF2-40B4-BE49-F238E27FC236}">
-                <a16:creationId xmlns:a16="http://schemas.microsoft.com/office/drawing/2014/main" id="{36296690-8B0A-C5D7-91C8-2CEEBE5581A5}"/>
+                <a16:creationId xmlns:a16="http://schemas.microsoft.com/office/drawing/2014/main" id="{95E2FC9C-3669-5F07-B55A-A84D091A566F}"/>
               </a:ext>
             </a:extLst>
           </p:cNvPr>
@@ -2438,7 +2117,7 @@
           <a:bodyPr/>
           <a:lstStyle/>
           <a:p>
-            <a:fld id="{5EB8AE7A-5D7C-42F9-B0FF-BD6A1C6BD2C9}" type="slidenum">
+            <a:fld id="{5566FF02-50DB-4D95-B327-2A85B84E33F0}" type="slidenum">
               <a:rPr lang="en-US" smtClean="0"/>
               <a:t>‹#›</a:t>
             </a:fld>
@@ -2449,7 +2128,7 @@
     </p:spTree>
     <p:extLst>
       <p:ext uri="{BB962C8B-B14F-4D97-AF65-F5344CB8AC3E}">
-        <p14:creationId xmlns:p14="http://schemas.microsoft.com/office/powerpoint/2010/main" val="685860304"/>
+        <p14:creationId xmlns:p14="http://schemas.microsoft.com/office/powerpoint/2010/main" val="420101346"/>
       </p:ext>
     </p:extLst>
   </p:cSld>
@@ -2481,7 +2160,7 @@
           <p:cNvPr id="2" name="Title 1">
             <a:extLst>
               <a:ext uri="{FF2B5EF4-FFF2-40B4-BE49-F238E27FC236}">
-                <a16:creationId xmlns:a16="http://schemas.microsoft.com/office/drawing/2014/main" id="{B398CE02-3FC7-FDE4-3B88-61526C853B11}"/>
+                <a16:creationId xmlns:a16="http://schemas.microsoft.com/office/drawing/2014/main" id="{7D653CB2-2057-1D52-E1A8-182D12C2CFCC}"/>
               </a:ext>
             </a:extLst>
           </p:cNvPr>
@@ -2518,7 +2197,7 @@
           <p:cNvPr id="3" name="Content Placeholder 2">
             <a:extLst>
               <a:ext uri="{FF2B5EF4-FFF2-40B4-BE49-F238E27FC236}">
-                <a16:creationId xmlns:a16="http://schemas.microsoft.com/office/drawing/2014/main" id="{B571DF2B-FD14-3BA6-1879-45292973BF74}"/>
+                <a16:creationId xmlns:a16="http://schemas.microsoft.com/office/drawing/2014/main" id="{ACE325F8-1CA5-2EE5-A613-7F639DC6B299}"/>
               </a:ext>
             </a:extLst>
           </p:cNvPr>
@@ -2608,7 +2287,7 @@
           <p:cNvPr id="4" name="Text Placeholder 3">
             <a:extLst>
               <a:ext uri="{FF2B5EF4-FFF2-40B4-BE49-F238E27FC236}">
-                <a16:creationId xmlns:a16="http://schemas.microsoft.com/office/drawing/2014/main" id="{C5150135-18F2-4E01-C8FE-3E45B99AE661}"/>
+                <a16:creationId xmlns:a16="http://schemas.microsoft.com/office/drawing/2014/main" id="{41EA66B4-8408-F8AA-BC8F-09B26C1173A4}"/>
               </a:ext>
             </a:extLst>
           </p:cNvPr>
@@ -2679,7 +2358,7 @@
           <p:cNvPr id="5" name="Date Placeholder 4">
             <a:extLst>
               <a:ext uri="{FF2B5EF4-FFF2-40B4-BE49-F238E27FC236}">
-                <a16:creationId xmlns:a16="http://schemas.microsoft.com/office/drawing/2014/main" id="{772A964D-BC68-40DE-91F0-57D1DF18C927}"/>
+                <a16:creationId xmlns:a16="http://schemas.microsoft.com/office/drawing/2014/main" id="{1FCF3B4F-4A36-C92D-A3AD-8785F0ED93BC}"/>
               </a:ext>
             </a:extLst>
           </p:cNvPr>
@@ -2695,9 +2374,9 @@
           <a:bodyPr/>
           <a:lstStyle/>
           <a:p>
-            <a:fld id="{819EBBFD-C5B0-4237-8EB7-3C06FAC0B4D4}" type="datetimeFigureOut">
+            <a:fld id="{47BA2DA0-6B40-4D5C-959C-1829054D176C}" type="datetimeFigureOut">
               <a:rPr lang="en-US" smtClean="0"/>
-              <a:t>1/30/2025</a:t>
+              <a:t>2/3/2025</a:t>
             </a:fld>
             <a:endParaRPr lang="en-US"/>
           </a:p>
@@ -2708,7 +2387,7 @@
           <p:cNvPr id="6" name="Footer Placeholder 5">
             <a:extLst>
               <a:ext uri="{FF2B5EF4-FFF2-40B4-BE49-F238E27FC236}">
-                <a16:creationId xmlns:a16="http://schemas.microsoft.com/office/drawing/2014/main" id="{C9BA28F4-9839-3CAC-52F8-6BC4A8851828}"/>
+                <a16:creationId xmlns:a16="http://schemas.microsoft.com/office/drawing/2014/main" id="{60D02E80-94CA-D568-9ECD-830E8117CCCD}"/>
               </a:ext>
             </a:extLst>
           </p:cNvPr>
@@ -2733,7 +2412,7 @@
           <p:cNvPr id="7" name="Slide Number Placeholder 6">
             <a:extLst>
               <a:ext uri="{FF2B5EF4-FFF2-40B4-BE49-F238E27FC236}">
-                <a16:creationId xmlns:a16="http://schemas.microsoft.com/office/drawing/2014/main" id="{EFB31A38-D0D7-AD24-9D23-570CB7009228}"/>
+                <a16:creationId xmlns:a16="http://schemas.microsoft.com/office/drawing/2014/main" id="{A1EE804E-1F06-34DE-9401-D0D77BE27F9E}"/>
               </a:ext>
             </a:extLst>
           </p:cNvPr>
@@ -2749,7 +2428,7 @@
           <a:bodyPr/>
           <a:lstStyle/>
           <a:p>
-            <a:fld id="{5EB8AE7A-5D7C-42F9-B0FF-BD6A1C6BD2C9}" type="slidenum">
+            <a:fld id="{5566FF02-50DB-4D95-B327-2A85B84E33F0}" type="slidenum">
               <a:rPr lang="en-US" smtClean="0"/>
               <a:t>‹#›</a:t>
             </a:fld>
@@ -2760,7 +2439,7 @@
     </p:spTree>
     <p:extLst>
       <p:ext uri="{BB962C8B-B14F-4D97-AF65-F5344CB8AC3E}">
-        <p14:creationId xmlns:p14="http://schemas.microsoft.com/office/powerpoint/2010/main" val="3586604266"/>
+        <p14:creationId xmlns:p14="http://schemas.microsoft.com/office/powerpoint/2010/main" val="3380589808"/>
       </p:ext>
     </p:extLst>
   </p:cSld>
@@ -2792,7 +2471,7 @@
           <p:cNvPr id="2" name="Title 1">
             <a:extLst>
               <a:ext uri="{FF2B5EF4-FFF2-40B4-BE49-F238E27FC236}">
-                <a16:creationId xmlns:a16="http://schemas.microsoft.com/office/drawing/2014/main" id="{4E61B23C-1AEC-F495-3ABB-B5C0A86C89F3}"/>
+                <a16:creationId xmlns:a16="http://schemas.microsoft.com/office/drawing/2014/main" id="{3C8C65E8-E192-F76B-2493-512E734C8191}"/>
               </a:ext>
             </a:extLst>
           </p:cNvPr>
@@ -2829,7 +2508,7 @@
           <p:cNvPr id="3" name="Picture Placeholder 2">
             <a:extLst>
               <a:ext uri="{FF2B5EF4-FFF2-40B4-BE49-F238E27FC236}">
-                <a16:creationId xmlns:a16="http://schemas.microsoft.com/office/drawing/2014/main" id="{4DC4D8AB-86B1-E383-30F5-80613F7D399C}"/>
+                <a16:creationId xmlns:a16="http://schemas.microsoft.com/office/drawing/2014/main" id="{0AEB69E6-E221-B893-986E-E822916F9825}"/>
               </a:ext>
             </a:extLst>
           </p:cNvPr>
@@ -2896,7 +2575,7 @@
           <p:cNvPr id="4" name="Text Placeholder 3">
             <a:extLst>
               <a:ext uri="{FF2B5EF4-FFF2-40B4-BE49-F238E27FC236}">
-                <a16:creationId xmlns:a16="http://schemas.microsoft.com/office/drawing/2014/main" id="{D8F3373F-2D0C-C6C7-F4CC-7C266DD6908B}"/>
+                <a16:creationId xmlns:a16="http://schemas.microsoft.com/office/drawing/2014/main" id="{20570733-B8B3-FD35-3C94-C9BDD8372CCD}"/>
               </a:ext>
             </a:extLst>
           </p:cNvPr>
@@ -2967,7 +2646,7 @@
           <p:cNvPr id="5" name="Date Placeholder 4">
             <a:extLst>
               <a:ext uri="{FF2B5EF4-FFF2-40B4-BE49-F238E27FC236}">
-                <a16:creationId xmlns:a16="http://schemas.microsoft.com/office/drawing/2014/main" id="{059CBC1B-E712-E042-9E4D-C447FA86533D}"/>
+                <a16:creationId xmlns:a16="http://schemas.microsoft.com/office/drawing/2014/main" id="{26A0A1D0-2BB4-DAB5-63E3-4E8D5D427023}"/>
               </a:ext>
             </a:extLst>
           </p:cNvPr>
@@ -2983,9 +2662,9 @@
           <a:bodyPr/>
           <a:lstStyle/>
           <a:p>
-            <a:fld id="{819EBBFD-C5B0-4237-8EB7-3C06FAC0B4D4}" type="datetimeFigureOut">
+            <a:fld id="{47BA2DA0-6B40-4D5C-959C-1829054D176C}" type="datetimeFigureOut">
               <a:rPr lang="en-US" smtClean="0"/>
-              <a:t>1/30/2025</a:t>
+              <a:t>2/3/2025</a:t>
             </a:fld>
             <a:endParaRPr lang="en-US"/>
           </a:p>
@@ -2996,7 +2675,7 @@
           <p:cNvPr id="6" name="Footer Placeholder 5">
             <a:extLst>
               <a:ext uri="{FF2B5EF4-FFF2-40B4-BE49-F238E27FC236}">
-                <a16:creationId xmlns:a16="http://schemas.microsoft.com/office/drawing/2014/main" id="{F5FED0D1-30A6-8B7B-406F-B0B92AFA57B5}"/>
+                <a16:creationId xmlns:a16="http://schemas.microsoft.com/office/drawing/2014/main" id="{4F39E4BA-7BC6-5B7E-C7B0-652C36297B08}"/>
               </a:ext>
             </a:extLst>
           </p:cNvPr>
@@ -3021,7 +2700,7 @@
           <p:cNvPr id="7" name="Slide Number Placeholder 6">
             <a:extLst>
               <a:ext uri="{FF2B5EF4-FFF2-40B4-BE49-F238E27FC236}">
-                <a16:creationId xmlns:a16="http://schemas.microsoft.com/office/drawing/2014/main" id="{4BE589A4-3174-917F-D49A-4CAAAFA12A68}"/>
+                <a16:creationId xmlns:a16="http://schemas.microsoft.com/office/drawing/2014/main" id="{5A41B873-71A8-E5C7-0742-37E10EF9F94C}"/>
               </a:ext>
             </a:extLst>
           </p:cNvPr>
@@ -3037,7 +2716,7 @@
           <a:bodyPr/>
           <a:lstStyle/>
           <a:p>
-            <a:fld id="{5EB8AE7A-5D7C-42F9-B0FF-BD6A1C6BD2C9}" type="slidenum">
+            <a:fld id="{5566FF02-50DB-4D95-B327-2A85B84E33F0}" type="slidenum">
               <a:rPr lang="en-US" smtClean="0"/>
               <a:t>‹#›</a:t>
             </a:fld>
@@ -3048,7 +2727,7 @@
     </p:spTree>
     <p:extLst>
       <p:ext uri="{BB962C8B-B14F-4D97-AF65-F5344CB8AC3E}">
-        <p14:creationId xmlns:p14="http://schemas.microsoft.com/office/powerpoint/2010/main" val="2789623833"/>
+        <p14:creationId xmlns:p14="http://schemas.microsoft.com/office/powerpoint/2010/main" val="1741997539"/>
       </p:ext>
     </p:extLst>
   </p:cSld>
@@ -3085,7 +2764,7 @@
           <p:cNvPr id="2" name="Title Placeholder 1">
             <a:extLst>
               <a:ext uri="{FF2B5EF4-FFF2-40B4-BE49-F238E27FC236}">
-                <a16:creationId xmlns:a16="http://schemas.microsoft.com/office/drawing/2014/main" id="{2011A9D2-3E9A-8D91-F581-D0BDC304D862}"/>
+                <a16:creationId xmlns:a16="http://schemas.microsoft.com/office/drawing/2014/main" id="{206021A9-10CA-0806-4761-F2765A8A29CD}"/>
               </a:ext>
             </a:extLst>
           </p:cNvPr>
@@ -3123,7 +2802,7 @@
           <p:cNvPr id="3" name="Text Placeholder 2">
             <a:extLst>
               <a:ext uri="{FF2B5EF4-FFF2-40B4-BE49-F238E27FC236}">
-                <a16:creationId xmlns:a16="http://schemas.microsoft.com/office/drawing/2014/main" id="{649B0288-1F06-826A-7C56-E31A6FFBCD9B}"/>
+                <a16:creationId xmlns:a16="http://schemas.microsoft.com/office/drawing/2014/main" id="{F09497CC-02EE-79B8-5DF7-02F27BFBA572}"/>
               </a:ext>
             </a:extLst>
           </p:cNvPr>
@@ -3190,7 +2869,7 @@
           <p:cNvPr id="4" name="Date Placeholder 3">
             <a:extLst>
               <a:ext uri="{FF2B5EF4-FFF2-40B4-BE49-F238E27FC236}">
-                <a16:creationId xmlns:a16="http://schemas.microsoft.com/office/drawing/2014/main" id="{4510D2D3-8F88-02AE-F0BD-2E5D7D7DD15E}"/>
+                <a16:creationId xmlns:a16="http://schemas.microsoft.com/office/drawing/2014/main" id="{AEC7B2DF-21C9-04B1-E629-A9418D0B955A}"/>
               </a:ext>
             </a:extLst>
           </p:cNvPr>
@@ -3224,9 +2903,9 @@
             </a:lvl1pPr>
           </a:lstStyle>
           <a:p>
-            <a:fld id="{819EBBFD-C5B0-4237-8EB7-3C06FAC0B4D4}" type="datetimeFigureOut">
+            <a:fld id="{47BA2DA0-6B40-4D5C-959C-1829054D176C}" type="datetimeFigureOut">
               <a:rPr lang="en-US" smtClean="0"/>
-              <a:t>1/30/2025</a:t>
+              <a:t>2/3/2025</a:t>
             </a:fld>
             <a:endParaRPr lang="en-US"/>
           </a:p>
@@ -3237,7 +2916,7 @@
           <p:cNvPr id="5" name="Footer Placeholder 4">
             <a:extLst>
               <a:ext uri="{FF2B5EF4-FFF2-40B4-BE49-F238E27FC236}">
-                <a16:creationId xmlns:a16="http://schemas.microsoft.com/office/drawing/2014/main" id="{EE225CD2-37A0-773D-1FFC-7E8512CAD9F5}"/>
+                <a16:creationId xmlns:a16="http://schemas.microsoft.com/office/drawing/2014/main" id="{0A57FD44-B6FC-AA0C-3A9F-B954D050105D}"/>
               </a:ext>
             </a:extLst>
           </p:cNvPr>
@@ -3280,7 +2959,7 @@
           <p:cNvPr id="6" name="Slide Number Placeholder 5">
             <a:extLst>
               <a:ext uri="{FF2B5EF4-FFF2-40B4-BE49-F238E27FC236}">
-                <a16:creationId xmlns:a16="http://schemas.microsoft.com/office/drawing/2014/main" id="{3A0E57F6-A38D-8A22-1B08-F30F7A915326}"/>
+                <a16:creationId xmlns:a16="http://schemas.microsoft.com/office/drawing/2014/main" id="{170572C8-A801-549E-44DC-8C7DED41F119}"/>
               </a:ext>
             </a:extLst>
           </p:cNvPr>
@@ -3314,7 +2993,7 @@
             </a:lvl1pPr>
           </a:lstStyle>
           <a:p>
-            <a:fld id="{5EB8AE7A-5D7C-42F9-B0FF-BD6A1C6BD2C9}" type="slidenum">
+            <a:fld id="{5566FF02-50DB-4D95-B327-2A85B84E33F0}" type="slidenum">
               <a:rPr lang="en-US" smtClean="0"/>
               <a:t>‹#›</a:t>
             </a:fld>
@@ -3325,7 +3004,7 @@
     </p:spTree>
     <p:extLst>
       <p:ext uri="{BB962C8B-B14F-4D97-AF65-F5344CB8AC3E}">
-        <p14:creationId xmlns:p14="http://schemas.microsoft.com/office/powerpoint/2010/main" val="1747069281"/>
+        <p14:creationId xmlns:p14="http://schemas.microsoft.com/office/powerpoint/2010/main" val="2105466100"/>
       </p:ext>
     </p:extLst>
   </p:cSld>
@@ -3629,14 +3308,6 @@
 <file path=ppt/slides/slide1.xml><?xml version="1.0" encoding="utf-8"?>
 <p:sld xmlns:a="http://schemas.openxmlformats.org/drawingml/2006/main" xmlns:r="http://schemas.openxmlformats.org/officeDocument/2006/relationships" xmlns:p="http://schemas.openxmlformats.org/presentationml/2006/main">
   <p:cSld>
-    <p:bg>
-      <p:bgPr>
-        <a:solidFill>
-          <a:schemeClr val="bg1"/>
-        </a:solidFill>
-        <a:effectLst/>
-      </p:bgPr>
-    </p:bg>
     <p:spTree>
       <p:nvGrpSpPr>
         <p:cNvPr id="1" name=""/>
@@ -3651,182 +3322,12 @@
           <a:chExt cx="0" cy="0"/>
         </a:xfrm>
       </p:grpSpPr>
-      <p:sp useBgFill="1">
-        <p:nvSpPr>
-          <p:cNvPr id="35" name="Rectangle 34">
-            <a:extLst>
-              <a:ext uri="{FF2B5EF4-FFF2-40B4-BE49-F238E27FC236}">
-                <a16:creationId xmlns:a16="http://schemas.microsoft.com/office/drawing/2014/main" id="{0671A8AE-40A1-4631-A6B8-581AFF065482}"/>
-              </a:ext>
-              <a:ext uri="{C183D7F6-B498-43B3-948B-1728B52AA6E4}">
-                <adec:decorative xmlns:adec="http://schemas.microsoft.com/office/drawing/2017/decorative" val="1"/>
-              </a:ext>
-            </a:extLst>
-          </p:cNvPr>
-          <p:cNvSpPr>
-            <a:spLocks noGrp="1" noRot="1" noChangeAspect="1" noMove="1" noResize="1" noEditPoints="1" noAdjustHandles="1" noChangeArrowheads="1" noChangeShapeType="1" noTextEdit="1"/>
-          </p:cNvSpPr>
-          <p:nvPr>
-            <p:extLst>
-              <p:ext uri="{386F3935-93C4-4BCD-93E2-E3B085C9AB24}">
-                <p16:designElem xmlns:p16="http://schemas.microsoft.com/office/powerpoint/2015/main" val="1"/>
-              </p:ext>
-            </p:extLst>
-          </p:nvPr>
-        </p:nvSpPr>
-        <p:spPr>
-          <a:xfrm>
-            <a:off x="0" y="0"/>
-            <a:ext cx="12192000" cy="6858000"/>
-          </a:xfrm>
-          <a:prstGeom prst="rect">
-            <a:avLst/>
-          </a:prstGeom>
-          <a:ln>
-            <a:noFill/>
-          </a:ln>
-        </p:spPr>
-        <p:style>
-          <a:lnRef idx="2">
-            <a:schemeClr val="accent1">
-              <a:shade val="50000"/>
-            </a:schemeClr>
-          </a:lnRef>
-          <a:fillRef idx="1">
-            <a:schemeClr val="accent1"/>
-          </a:fillRef>
-          <a:effectRef idx="0">
-            <a:schemeClr val="accent1"/>
-          </a:effectRef>
-          <a:fontRef idx="minor">
-            <a:schemeClr val="lt1"/>
-          </a:fontRef>
-        </p:style>
-        <p:txBody>
-          <a:bodyPr rtlCol="0" anchor="ctr"/>
-          <a:lstStyle/>
-          <a:p>
-            <a:pPr algn="ctr"/>
-            <a:endParaRPr lang="en-US"/>
-          </a:p>
-        </p:txBody>
-      </p:sp>
-      <p:pic>
-        <p:nvPicPr>
-          <p:cNvPr id="5" name="Picture 4">
-            <a:extLst>
-              <a:ext uri="{FF2B5EF4-FFF2-40B4-BE49-F238E27FC236}">
-                <a16:creationId xmlns:a16="http://schemas.microsoft.com/office/drawing/2014/main" id="{24C2E288-0B39-D9EE-30BB-AC7C4E489869}"/>
-              </a:ext>
-            </a:extLst>
-          </p:cNvPr>
-          <p:cNvPicPr>
-            <a:picLocks noChangeAspect="1"/>
-          </p:cNvPicPr>
-          <p:nvPr/>
-        </p:nvPicPr>
-        <p:blipFill>
-          <a:blip r:embed="rId2"/>
-          <a:srcRect t="7796" r="9089" b="4225"/>
-          <a:stretch/>
-        </p:blipFill>
-        <p:spPr>
-          <a:xfrm>
-            <a:off x="3523488" y="10"/>
-            <a:ext cx="8668512" cy="6857990"/>
-          </a:xfrm>
-          <a:prstGeom prst="rect">
-            <a:avLst/>
-          </a:prstGeom>
-        </p:spPr>
-      </p:pic>
-      <p:sp>
-        <p:nvSpPr>
-          <p:cNvPr id="36" name="Rectangle 35">
-            <a:extLst>
-              <a:ext uri="{FF2B5EF4-FFF2-40B4-BE49-F238E27FC236}">
-                <a16:creationId xmlns:a16="http://schemas.microsoft.com/office/drawing/2014/main" id="{AB58EF07-17C2-48CF-ABB0-EEF1F17CB8F0}"/>
-              </a:ext>
-              <a:ext uri="{C183D7F6-B498-43B3-948B-1728B52AA6E4}">
-                <adec:decorative xmlns:adec="http://schemas.microsoft.com/office/drawing/2017/decorative" val="1"/>
-              </a:ext>
-            </a:extLst>
-          </p:cNvPr>
-          <p:cNvSpPr>
-            <a:spLocks noGrp="1" noRot="1" noChangeAspect="1" noMove="1" noResize="1" noEditPoints="1" noAdjustHandles="1" noChangeArrowheads="1" noChangeShapeType="1" noTextEdit="1"/>
-          </p:cNvSpPr>
-          <p:nvPr>
-            <p:extLst>
-              <p:ext uri="{386F3935-93C4-4BCD-93E2-E3B085C9AB24}">
-                <p16:designElem xmlns:p16="http://schemas.microsoft.com/office/powerpoint/2015/main" val="1"/>
-              </p:ext>
-            </p:extLst>
-          </p:nvPr>
-        </p:nvSpPr>
-        <p:spPr>
-          <a:xfrm>
-            <a:off x="3" y="0"/>
-            <a:ext cx="9339206" cy="6858000"/>
-          </a:xfrm>
-          <a:prstGeom prst="rect">
-            <a:avLst/>
-          </a:prstGeom>
-          <a:gradFill>
-            <a:gsLst>
-              <a:gs pos="58000">
-                <a:schemeClr val="tx1"/>
-              </a:gs>
-              <a:gs pos="33000">
-                <a:schemeClr val="tx1">
-                  <a:alpha val="64000"/>
-                </a:schemeClr>
-              </a:gs>
-              <a:gs pos="0">
-                <a:schemeClr val="tx1">
-                  <a:alpha val="0"/>
-                </a:schemeClr>
-              </a:gs>
-              <a:gs pos="100000">
-                <a:schemeClr val="tx1"/>
-              </a:gs>
-            </a:gsLst>
-            <a:lin ang="10800000" scaled="0"/>
-          </a:gradFill>
-          <a:ln>
-            <a:noFill/>
-          </a:ln>
-        </p:spPr>
-        <p:style>
-          <a:lnRef idx="2">
-            <a:schemeClr val="accent1">
-              <a:shade val="50000"/>
-            </a:schemeClr>
-          </a:lnRef>
-          <a:fillRef idx="1">
-            <a:schemeClr val="accent1"/>
-          </a:fillRef>
-          <a:effectRef idx="0">
-            <a:schemeClr val="accent1"/>
-          </a:effectRef>
-          <a:fontRef idx="minor">
-            <a:schemeClr val="lt1"/>
-          </a:fontRef>
-        </p:style>
-        <p:txBody>
-          <a:bodyPr rtlCol="0" anchor="ctr"/>
-          <a:lstStyle/>
-          <a:p>
-            <a:pPr algn="ctr"/>
-            <a:endParaRPr lang="en-US" dirty="0"/>
-          </a:p>
-        </p:txBody>
-      </p:sp>
       <p:sp>
         <p:nvSpPr>
           <p:cNvPr id="2" name="Title 1">
             <a:extLst>
               <a:ext uri="{FF2B5EF4-FFF2-40B4-BE49-F238E27FC236}">
-                <a16:creationId xmlns:a16="http://schemas.microsoft.com/office/drawing/2014/main" id="{53AFA96C-BF42-B18A-E6EA-2CC58746410C}"/>
+                <a16:creationId xmlns:a16="http://schemas.microsoft.com/office/drawing/2014/main" id="{1B6DE579-3AC9-60AD-E392-D148D43D67DD}"/>
               </a:ext>
             </a:extLst>
           </p:cNvPr>
@@ -3837,24 +3338,15 @@
             <p:ph type="ctrTitle"/>
           </p:nvPr>
         </p:nvSpPr>
-        <p:spPr>
-          <a:xfrm>
-            <a:off x="477981" y="1122363"/>
-            <a:ext cx="4023360" cy="3204134"/>
-          </a:xfrm>
-        </p:spPr>
-        <p:txBody>
-          <a:bodyPr anchor="b">
-            <a:normAutofit/>
-          </a:bodyPr>
-          <a:lstStyle/>
-          <a:p>
-            <a:pPr algn="l"/>
-            <a:endParaRPr lang="en-US" sz="4800" dirty="0">
-              <a:solidFill>
-                <a:schemeClr val="bg1"/>
-              </a:solidFill>
-            </a:endParaRPr>
+        <p:spPr/>
+        <p:txBody>
+          <a:bodyPr/>
+          <a:lstStyle/>
+          <a:p>
+            <a:r>
+              <a:rPr lang="en-US" dirty="0"/>
+              <a:t>PRESENTATION TITLE</a:t>
+            </a:r>
           </a:p>
         </p:txBody>
       </p:sp>
@@ -3863,7 +3355,7 @@
           <p:cNvPr id="3" name="Subtitle 2">
             <a:extLst>
               <a:ext uri="{FF2B5EF4-FFF2-40B4-BE49-F238E27FC236}">
-                <a16:creationId xmlns:a16="http://schemas.microsoft.com/office/drawing/2014/main" id="{7F96D901-7072-E096-9E66-44CB9B4C9513}"/>
+                <a16:creationId xmlns:a16="http://schemas.microsoft.com/office/drawing/2014/main" id="{FB50974B-0B16-3329-6F98-DBB7E420A510}"/>
               </a:ext>
             </a:extLst>
           </p:cNvPr>
@@ -3874,192 +3366,22 @@
             <p:ph type="subTitle" idx="1"/>
           </p:nvPr>
         </p:nvSpPr>
-        <p:spPr>
-          <a:xfrm>
-            <a:off x="477980" y="4872922"/>
-            <a:ext cx="4023359" cy="1208141"/>
-          </a:xfrm>
-        </p:spPr>
-        <p:txBody>
-          <a:bodyPr>
-            <a:normAutofit/>
-          </a:bodyPr>
-          <a:lstStyle/>
-          <a:p>
-            <a:pPr algn="l"/>
-            <a:endParaRPr lang="en-US" sz="2000">
-              <a:solidFill>
-                <a:schemeClr val="bg1"/>
-              </a:solidFill>
-            </a:endParaRPr>
-          </a:p>
-        </p:txBody>
-      </p:sp>
-      <p:sp>
-        <p:nvSpPr>
-          <p:cNvPr id="37" name="Rectangle 36">
-            <a:extLst>
-              <a:ext uri="{FF2B5EF4-FFF2-40B4-BE49-F238E27FC236}">
-                <a16:creationId xmlns:a16="http://schemas.microsoft.com/office/drawing/2014/main" id="{AF2F604E-43BE-4DC3-B983-E071523364F8}"/>
-              </a:ext>
-              <a:ext uri="{C183D7F6-B498-43B3-948B-1728B52AA6E4}">
-                <adec:decorative xmlns:adec="http://schemas.microsoft.com/office/drawing/2017/decorative" val="1"/>
-              </a:ext>
-            </a:extLst>
-          </p:cNvPr>
-          <p:cNvSpPr>
-            <a:spLocks noGrp="1" noRot="1" noChangeAspect="1" noMove="1" noResize="1" noEditPoints="1" noAdjustHandles="1" noChangeArrowheads="1" noChangeShapeType="1" noTextEdit="1"/>
-          </p:cNvSpPr>
-          <p:nvPr>
-            <p:extLst>
-              <p:ext uri="{386F3935-93C4-4BCD-93E2-E3B085C9AB24}">
-                <p16:designElem xmlns:p16="http://schemas.microsoft.com/office/powerpoint/2015/main" val="1"/>
-              </p:ext>
-            </p:extLst>
-          </p:nvPr>
-        </p:nvSpPr>
-        <p:spPr>
-          <a:xfrm rot="5400000">
-            <a:off x="759921" y="346791"/>
-            <a:ext cx="146304" cy="704088"/>
-          </a:xfrm>
-          <a:prstGeom prst="rect">
-            <a:avLst/>
-          </a:prstGeom>
-          <a:solidFill>
-            <a:schemeClr val="accent2"/>
-          </a:solidFill>
-          <a:ln>
-            <a:noFill/>
-          </a:ln>
-        </p:spPr>
-        <p:style>
-          <a:lnRef idx="2">
-            <a:schemeClr val="accent1">
-              <a:shade val="50000"/>
-            </a:schemeClr>
-          </a:lnRef>
-          <a:fillRef idx="1">
-            <a:schemeClr val="accent1"/>
-          </a:fillRef>
-          <a:effectRef idx="0">
-            <a:schemeClr val="accent1"/>
-          </a:effectRef>
-          <a:fontRef idx="minor">
-            <a:schemeClr val="lt1"/>
-          </a:fontRef>
-        </p:style>
-        <p:txBody>
-          <a:bodyPr rtlCol="0" anchor="ctr"/>
-          <a:lstStyle/>
-          <a:p>
-            <a:pPr algn="ctr"/>
-            <a:endParaRPr lang="en-US">
-              <a:solidFill>
-                <a:prstClr val="white"/>
-              </a:solidFill>
-              <a:latin typeface="Calibri" panose="020F0502020204030204"/>
-            </a:endParaRPr>
-          </a:p>
-        </p:txBody>
-      </p:sp>
-      <p:sp>
-        <p:nvSpPr>
-          <p:cNvPr id="38" name="Rectangle 37">
-            <a:extLst>
-              <a:ext uri="{FF2B5EF4-FFF2-40B4-BE49-F238E27FC236}">
-                <a16:creationId xmlns:a16="http://schemas.microsoft.com/office/drawing/2014/main" id="{08C9B587-E65E-4B52-B37C-ABEBB6E87928}"/>
-              </a:ext>
-              <a:ext uri="{C183D7F6-B498-43B3-948B-1728B52AA6E4}">
-                <adec:decorative xmlns:adec="http://schemas.microsoft.com/office/drawing/2017/decorative" val="1"/>
-              </a:ext>
-            </a:extLst>
-          </p:cNvPr>
-          <p:cNvSpPr>
-            <a:spLocks noGrp="1" noRot="1" noChangeAspect="1" noMove="1" noResize="1" noEditPoints="1" noAdjustHandles="1" noChangeArrowheads="1" noChangeShapeType="1" noTextEdit="1"/>
-          </p:cNvSpPr>
-          <p:nvPr>
-            <p:extLst>
-              <p:ext uri="{386F3935-93C4-4BCD-93E2-E3B085C9AB24}">
-                <p16:designElem xmlns:p16="http://schemas.microsoft.com/office/powerpoint/2015/main" val="1"/>
-              </p:ext>
-            </p:extLst>
-          </p:nvPr>
-        </p:nvSpPr>
-        <p:spPr>
-          <a:xfrm>
-            <a:off x="481029" y="4546920"/>
-            <a:ext cx="3977640" cy="18288"/>
-          </a:xfrm>
-          <a:prstGeom prst="rect">
-            <a:avLst/>
-          </a:prstGeom>
-          <a:solidFill>
-            <a:schemeClr val="tx1"/>
-          </a:solidFill>
-          <a:ln w="3175">
-            <a:noFill/>
-          </a:ln>
-          <a:effectLst/>
-        </p:spPr>
-        <p:style>
-          <a:lnRef idx="2">
-            <a:schemeClr val="accent1">
-              <a:shade val="50000"/>
-            </a:schemeClr>
-          </a:lnRef>
-          <a:fillRef idx="1">
-            <a:schemeClr val="accent1"/>
-          </a:fillRef>
-          <a:effectRef idx="0">
-            <a:schemeClr val="accent1"/>
-          </a:effectRef>
-          <a:fontRef idx="minor">
-            <a:schemeClr val="lt1"/>
-          </a:fontRef>
-        </p:style>
-        <p:txBody>
-          <a:bodyPr rtlCol="0" anchor="ctr"/>
-          <a:lstStyle/>
-          <a:p>
-            <a:pPr marL="0" marR="0" lvl="0" indent="0" algn="ctr" defTabSz="914400" rtl="0" eaLnBrk="1" fontAlgn="auto" latinLnBrk="0" hangingPunct="1">
-              <a:lnSpc>
-                <a:spcPct val="100000"/>
-              </a:lnSpc>
-              <a:spcBef>
-                <a:spcPts val="0"/>
-              </a:spcBef>
-              <a:spcAft>
-                <a:spcPts val="0"/>
-              </a:spcAft>
-              <a:buClrTx/>
-              <a:buSzTx/>
-              <a:buFontTx/>
-              <a:buNone/>
-              <a:tabLst/>
-              <a:defRPr/>
-            </a:pPr>
-            <a:endParaRPr kumimoji="0" lang="en-US" sz="1800" b="0" i="0" u="none" strike="noStrike" kern="1200" cap="none" spc="0" normalizeH="0" baseline="0" noProof="0">
-              <a:ln>
-                <a:noFill/>
-              </a:ln>
-              <a:solidFill>
-                <a:prstClr val="white"/>
-              </a:solidFill>
-              <a:effectLst/>
-              <a:uLnTx/>
-              <a:uFillTx/>
-              <a:latin typeface="Calibri" panose="020F0502020204030204"/>
-              <a:ea typeface="+mn-ea"/>
-              <a:cs typeface="+mn-cs"/>
-            </a:endParaRPr>
+        <p:spPr/>
+        <p:txBody>
+          <a:bodyPr/>
+          <a:lstStyle/>
+          <a:p>
+            <a:r>
+              <a:rPr lang="en-US" dirty="0"/>
+              <a:t>Presentation subtitle</a:t>
+            </a:r>
           </a:p>
         </p:txBody>
       </p:sp>
     </p:spTree>
     <p:extLst>
       <p:ext uri="{BB962C8B-B14F-4D97-AF65-F5344CB8AC3E}">
-        <p14:creationId xmlns:p14="http://schemas.microsoft.com/office/powerpoint/2010/main" val="1256506707"/>
+        <p14:creationId xmlns:p14="http://schemas.microsoft.com/office/powerpoint/2010/main" val="2051316986"/>
       </p:ext>
     </p:extLst>
   </p:cSld>
@@ -4088,80 +3410,10 @@
       </p:grpSpPr>
       <p:sp>
         <p:nvSpPr>
-          <p:cNvPr id="8" name="Rectangle 7">
-            <a:extLst>
-              <a:ext uri="{FF2B5EF4-FFF2-40B4-BE49-F238E27FC236}">
-                <a16:creationId xmlns:a16="http://schemas.microsoft.com/office/drawing/2014/main" id="{A7AE9375-4664-4DB2-922D-2782A6E439AC}"/>
-              </a:ext>
-              <a:ext uri="{C183D7F6-B498-43B3-948B-1728B52AA6E4}">
-                <adec:decorative xmlns:adec="http://schemas.microsoft.com/office/drawing/2017/decorative" val="1"/>
-              </a:ext>
-            </a:extLst>
-          </p:cNvPr>
-          <p:cNvSpPr>
-            <a:spLocks noGrp="1" noRot="1" noChangeAspect="1" noMove="1" noResize="1" noEditPoints="1" noAdjustHandles="1" noChangeArrowheads="1" noChangeShapeType="1" noTextEdit="1"/>
-          </p:cNvSpPr>
-          <p:nvPr>
-            <p:extLst>
-              <p:ext uri="{386F3935-93C4-4BCD-93E2-E3B085C9AB24}">
-                <p16:designElem xmlns:p16="http://schemas.microsoft.com/office/powerpoint/2015/main" val="1"/>
-              </p:ext>
-            </p:extLst>
-          </p:nvPr>
-        </p:nvSpPr>
-        <p:spPr>
-          <a:xfrm>
-            <a:off x="0" y="0"/>
-            <a:ext cx="12192000" cy="6858000"/>
-          </a:xfrm>
-          <a:prstGeom prst="rect">
-            <a:avLst/>
-          </a:prstGeom>
-          <a:solidFill>
-            <a:schemeClr val="tx1">
-              <a:lumMod val="95000"/>
-              <a:lumOff val="5000"/>
-            </a:schemeClr>
-          </a:solidFill>
-          <a:ln>
-            <a:noFill/>
-          </a:ln>
-        </p:spPr>
-        <p:style>
-          <a:lnRef idx="2">
-            <a:schemeClr val="accent1">
-              <a:shade val="50000"/>
-            </a:schemeClr>
-          </a:lnRef>
-          <a:fillRef idx="1">
-            <a:schemeClr val="accent1"/>
-          </a:fillRef>
-          <a:effectRef idx="0">
-            <a:schemeClr val="accent1"/>
-          </a:effectRef>
-          <a:fontRef idx="minor">
-            <a:schemeClr val="lt1"/>
-          </a:fontRef>
-        </p:style>
-        <p:txBody>
-          <a:bodyPr rtlCol="0" anchor="ctr"/>
-          <a:lstStyle/>
-          <a:p>
-            <a:pPr algn="ctr"/>
-            <a:endParaRPr lang="en-US" dirty="0">
-              <a:solidFill>
-                <a:schemeClr val="tx1"/>
-              </a:solidFill>
-            </a:endParaRPr>
-          </a:p>
-        </p:txBody>
-      </p:sp>
-      <p:sp>
-        <p:nvSpPr>
           <p:cNvPr id="2" name="Title 1">
             <a:extLst>
               <a:ext uri="{FF2B5EF4-FFF2-40B4-BE49-F238E27FC236}">
-                <a16:creationId xmlns:a16="http://schemas.microsoft.com/office/drawing/2014/main" id="{DEF16B24-8BEA-F7FD-81A1-3CB673BB86E3}"/>
+                <a16:creationId xmlns:a16="http://schemas.microsoft.com/office/drawing/2014/main" id="{4E8A55E9-F6FC-338B-0F69-FF34CDD7941B}"/>
               </a:ext>
             </a:extLst>
           </p:cNvPr>
@@ -4172,85 +3424,24 @@
             <p:ph type="title"/>
           </p:nvPr>
         </p:nvSpPr>
-        <p:spPr>
-          <a:xfrm>
-            <a:off x="838200" y="669925"/>
-            <a:ext cx="4508946" cy="1325563"/>
-          </a:xfrm>
-        </p:spPr>
-        <p:txBody>
-          <a:bodyPr anchor="b">
-            <a:normAutofit/>
-          </a:bodyPr>
-          <a:lstStyle/>
-          <a:p>
-            <a:pPr algn="r"/>
-            <a:endParaRPr lang="en-US" dirty="0">
-              <a:solidFill>
-                <a:schemeClr val="bg1"/>
-              </a:solidFill>
-            </a:endParaRPr>
-          </a:p>
-        </p:txBody>
-      </p:sp>
-      <p:cxnSp>
-        <p:nvCxnSpPr>
-          <p:cNvPr id="10" name="Straight Connector 9">
-            <a:extLst>
-              <a:ext uri="{FF2B5EF4-FFF2-40B4-BE49-F238E27FC236}">
-                <a16:creationId xmlns:a16="http://schemas.microsoft.com/office/drawing/2014/main" id="{EE504C98-6397-41C1-A8D8-2D9C4ED307E0}"/>
-              </a:ext>
-              <a:ext uri="{C183D7F6-B498-43B3-948B-1728B52AA6E4}">
-                <adec:decorative xmlns:adec="http://schemas.microsoft.com/office/drawing/2017/decorative" val="1"/>
-              </a:ext>
-            </a:extLst>
-          </p:cNvPr>
-          <p:cNvCxnSpPr>
-            <a:cxnSpLocks noGrp="1" noRot="1" noChangeAspect="1" noMove="1" noResize="1" noEditPoints="1" noAdjustHandles="1" noChangeArrowheads="1" noChangeShapeType="1"/>
-          </p:cNvCxnSpPr>
-          <p:nvPr>
-            <p:extLst>
-              <p:ext uri="{386F3935-93C4-4BCD-93E2-E3B085C9AB24}">
-                <p16:designElem xmlns:p16="http://schemas.microsoft.com/office/powerpoint/2015/main" val="1"/>
-              </p:ext>
-            </p:extLst>
-          </p:nvPr>
-        </p:nvCxnSpPr>
-        <p:spPr>
-          <a:xfrm flipH="1">
-            <a:off x="126210" y="2026340"/>
-            <a:ext cx="5220936" cy="0"/>
-          </a:xfrm>
-          <a:prstGeom prst="line">
-            <a:avLst/>
-          </a:prstGeom>
-          <a:ln w="12700">
-            <a:solidFill>
-              <a:schemeClr val="accent2"/>
-            </a:solidFill>
-          </a:ln>
-        </p:spPr>
-        <p:style>
-          <a:lnRef idx="1">
-            <a:schemeClr val="accent1"/>
-          </a:lnRef>
-          <a:fillRef idx="0">
-            <a:schemeClr val="accent1"/>
-          </a:fillRef>
-          <a:effectRef idx="0">
-            <a:schemeClr val="accent1"/>
-          </a:effectRef>
-          <a:fontRef idx="minor">
-            <a:schemeClr val="tx1"/>
-          </a:fontRef>
-        </p:style>
-      </p:cxnSp>
+        <p:spPr/>
+        <p:txBody>
+          <a:bodyPr/>
+          <a:lstStyle/>
+          <a:p>
+            <a:r>
+              <a:rPr lang="en-US" dirty="0"/>
+              <a:t>SLIDE TITLE	</a:t>
+            </a:r>
+          </a:p>
+        </p:txBody>
+      </p:sp>
       <p:sp>
         <p:nvSpPr>
           <p:cNvPr id="3" name="Content Placeholder 2">
             <a:extLst>
               <a:ext uri="{FF2B5EF4-FFF2-40B4-BE49-F238E27FC236}">
-                <a16:creationId xmlns:a16="http://schemas.microsoft.com/office/drawing/2014/main" id="{7AEC15A1-7C6F-782E-1DEC-3D3AC2FCE286}"/>
+                <a16:creationId xmlns:a16="http://schemas.microsoft.com/office/drawing/2014/main" id="{98578889-30B7-D1A3-FB9B-7E498DE25BF4}"/>
               </a:ext>
             </a:extLst>
           </p:cNvPr>
@@ -4261,93 +3452,22 @@
             <p:ph idx="1"/>
           </p:nvPr>
         </p:nvSpPr>
-        <p:spPr>
-          <a:xfrm>
-            <a:off x="1392667" y="2398957"/>
-            <a:ext cx="9406666" cy="3526144"/>
-          </a:xfrm>
-        </p:spPr>
-        <p:txBody>
-          <a:bodyPr>
-            <a:normAutofit/>
-          </a:bodyPr>
-          <a:lstStyle/>
-          <a:p>
-            <a:endParaRPr lang="en-US" sz="2000">
-              <a:solidFill>
-                <a:schemeClr val="bg1"/>
-              </a:solidFill>
-            </a:endParaRPr>
-          </a:p>
-        </p:txBody>
-      </p:sp>
-      <p:sp>
-        <p:nvSpPr>
-          <p:cNvPr id="12" name="Rectangle 11">
-            <a:extLst>
-              <a:ext uri="{FF2B5EF4-FFF2-40B4-BE49-F238E27FC236}">
-                <a16:creationId xmlns:a16="http://schemas.microsoft.com/office/drawing/2014/main" id="{9DD005C1-8C51-42D6-9BEE-B9B83849743D}"/>
-              </a:ext>
-              <a:ext uri="{C183D7F6-B498-43B3-948B-1728B52AA6E4}">
-                <adec:decorative xmlns:adec="http://schemas.microsoft.com/office/drawing/2017/decorative" val="1"/>
-              </a:ext>
-            </a:extLst>
-          </p:cNvPr>
-          <p:cNvSpPr>
-            <a:spLocks noGrp="1" noRot="1" noChangeAspect="1" noMove="1" noResize="1" noEditPoints="1" noAdjustHandles="1" noChangeArrowheads="1" noChangeShapeType="1" noTextEdit="1"/>
-          </p:cNvSpPr>
-          <p:nvPr>
-            <p:extLst>
-              <p:ext uri="{386F3935-93C4-4BCD-93E2-E3B085C9AB24}">
-                <p16:designElem xmlns:p16="http://schemas.microsoft.com/office/powerpoint/2015/main" val="1"/>
-              </p:ext>
-            </p:extLst>
-          </p:nvPr>
-        </p:nvSpPr>
-        <p:spPr>
-          <a:xfrm>
-            <a:off x="126206" y="115193"/>
-            <a:ext cx="11939588" cy="6627614"/>
-          </a:xfrm>
-          <a:prstGeom prst="rect">
-            <a:avLst/>
-          </a:prstGeom>
-          <a:noFill/>
-          <a:ln w="12700">
-            <a:solidFill>
-              <a:schemeClr val="accent2"/>
-            </a:solidFill>
-          </a:ln>
-        </p:spPr>
-        <p:style>
-          <a:lnRef idx="2">
-            <a:schemeClr val="accent1">
-              <a:shade val="50000"/>
-            </a:schemeClr>
-          </a:lnRef>
-          <a:fillRef idx="1">
-            <a:schemeClr val="accent1"/>
-          </a:fillRef>
-          <a:effectRef idx="0">
-            <a:schemeClr val="accent1"/>
-          </a:effectRef>
-          <a:fontRef idx="minor">
-            <a:schemeClr val="lt1"/>
-          </a:fontRef>
-        </p:style>
-        <p:txBody>
-          <a:bodyPr rtlCol="0" anchor="ctr"/>
-          <a:lstStyle/>
-          <a:p>
-            <a:pPr algn="ctr"/>
-            <a:endParaRPr lang="en-US"/>
+        <p:spPr/>
+        <p:txBody>
+          <a:bodyPr/>
+          <a:lstStyle/>
+          <a:p>
+            <a:r>
+              <a:rPr lang="en-US" dirty="0"/>
+              <a:t>Slide Text</a:t>
+            </a:r>
           </a:p>
         </p:txBody>
       </p:sp>
     </p:spTree>
     <p:extLst>
       <p:ext uri="{BB962C8B-B14F-4D97-AF65-F5344CB8AC3E}">
-        <p14:creationId xmlns:p14="http://schemas.microsoft.com/office/powerpoint/2010/main" val="2627065407"/>
+        <p14:creationId xmlns:p14="http://schemas.microsoft.com/office/powerpoint/2010/main" val="3535055859"/>
       </p:ext>
     </p:extLst>
   </p:cSld>

</xml_diff>

<commit_message>
feat: generate presentation from text
</commit_message>
<xml_diff>
--- a/assets/PresentationTemplate.pptx
+++ b/assets/PresentationTemplate.pptx
@@ -105,6 +105,11 @@
       </a:defRPr>
     </a:lvl9pPr>
   </p:defaultTextStyle>
+  <p:extLst>
+    <p:ext uri="{EFAFB233-063F-42B5-8137-9DF3F51BA10A}">
+      <p15:sldGuideLst xmlns:p15="http://schemas.microsoft.com/office/powerpoint/2012/main"/>
+    </p:ext>
+  </p:extLst>
 </p:presentation>
 </file>
 
@@ -3459,7 +3464,7 @@
           <a:p>
             <a:r>
               <a:rPr lang="en-US" dirty="0"/>
-              <a:t>Slide Text</a:t>
+              <a:t>Slide Text Bullet List</a:t>
             </a:r>
           </a:p>
         </p:txBody>

</xml_diff>